<commit_message>
Mapa da empatia - em andamento
</commit_message>
<xml_diff>
--- a/Mapa de Empatia.pptx
+++ b/Mapa de Empatia.pptx
@@ -6,7 +6,8 @@
   </p:sldMasterIdLst>
   <p:sldIdLst>
     <p:sldId id="256" r:id="rId2"/>
-    <p:sldId id="257" r:id="rId3"/>
+    <p:sldId id="258" r:id="rId3"/>
+    <p:sldId id="257" r:id="rId4"/>
   </p:sldIdLst>
   <p:sldSz cx="12192000" cy="6858000"/>
   <p:notesSz cx="6858000" cy="9144000"/>
@@ -105,6 +106,11 @@
       </a:defRPr>
     </a:lvl9pPr>
   </p:defaultTextStyle>
+  <p:extLst>
+    <p:ext uri="{EFAFB233-063F-42B5-8137-9DF3F51BA10A}">
+      <p15:sldGuideLst xmlns:p15="http://schemas.microsoft.com/office/powerpoint/2012/main"/>
+    </p:ext>
+  </p:extLst>
 </p:presentation>
 </file>
 
@@ -257,7 +263,7 @@
           <a:p>
             <a:fld id="{94E91461-1597-4FD2-957C-70C5CCB9C0B0}" type="datetimeFigureOut">
               <a:rPr lang="pt-BR" smtClean="0"/>
-              <a:t>06/03/2020</a:t>
+              <a:t>10/03/2020</a:t>
             </a:fld>
             <a:endParaRPr lang="pt-BR"/>
           </a:p>
@@ -457,7 +463,7 @@
           <a:p>
             <a:fld id="{94E91461-1597-4FD2-957C-70C5CCB9C0B0}" type="datetimeFigureOut">
               <a:rPr lang="pt-BR" smtClean="0"/>
-              <a:t>06/03/2020</a:t>
+              <a:t>10/03/2020</a:t>
             </a:fld>
             <a:endParaRPr lang="pt-BR"/>
           </a:p>
@@ -667,7 +673,7 @@
           <a:p>
             <a:fld id="{94E91461-1597-4FD2-957C-70C5CCB9C0B0}" type="datetimeFigureOut">
               <a:rPr lang="pt-BR" smtClean="0"/>
-              <a:t>06/03/2020</a:t>
+              <a:t>10/03/2020</a:t>
             </a:fld>
             <a:endParaRPr lang="pt-BR"/>
           </a:p>
@@ -867,7 +873,7 @@
           <a:p>
             <a:fld id="{94E91461-1597-4FD2-957C-70C5CCB9C0B0}" type="datetimeFigureOut">
               <a:rPr lang="pt-BR" smtClean="0"/>
-              <a:t>06/03/2020</a:t>
+              <a:t>10/03/2020</a:t>
             </a:fld>
             <a:endParaRPr lang="pt-BR"/>
           </a:p>
@@ -1143,7 +1149,7 @@
           <a:p>
             <a:fld id="{94E91461-1597-4FD2-957C-70C5CCB9C0B0}" type="datetimeFigureOut">
               <a:rPr lang="pt-BR" smtClean="0"/>
-              <a:t>06/03/2020</a:t>
+              <a:t>10/03/2020</a:t>
             </a:fld>
             <a:endParaRPr lang="pt-BR"/>
           </a:p>
@@ -1411,7 +1417,7 @@
           <a:p>
             <a:fld id="{94E91461-1597-4FD2-957C-70C5CCB9C0B0}" type="datetimeFigureOut">
               <a:rPr lang="pt-BR" smtClean="0"/>
-              <a:t>06/03/2020</a:t>
+              <a:t>10/03/2020</a:t>
             </a:fld>
             <a:endParaRPr lang="pt-BR"/>
           </a:p>
@@ -1826,7 +1832,7 @@
           <a:p>
             <a:fld id="{94E91461-1597-4FD2-957C-70C5CCB9C0B0}" type="datetimeFigureOut">
               <a:rPr lang="pt-BR" smtClean="0"/>
-              <a:t>06/03/2020</a:t>
+              <a:t>10/03/2020</a:t>
             </a:fld>
             <a:endParaRPr lang="pt-BR"/>
           </a:p>
@@ -1968,7 +1974,7 @@
           <a:p>
             <a:fld id="{94E91461-1597-4FD2-957C-70C5CCB9C0B0}" type="datetimeFigureOut">
               <a:rPr lang="pt-BR" smtClean="0"/>
-              <a:t>06/03/2020</a:t>
+              <a:t>10/03/2020</a:t>
             </a:fld>
             <a:endParaRPr lang="pt-BR"/>
           </a:p>
@@ -2081,7 +2087,7 @@
           <a:p>
             <a:fld id="{94E91461-1597-4FD2-957C-70C5CCB9C0B0}" type="datetimeFigureOut">
               <a:rPr lang="pt-BR" smtClean="0"/>
-              <a:t>06/03/2020</a:t>
+              <a:t>10/03/2020</a:t>
             </a:fld>
             <a:endParaRPr lang="pt-BR"/>
           </a:p>
@@ -2394,7 +2400,7 @@
           <a:p>
             <a:fld id="{94E91461-1597-4FD2-957C-70C5CCB9C0B0}" type="datetimeFigureOut">
               <a:rPr lang="pt-BR" smtClean="0"/>
-              <a:t>06/03/2020</a:t>
+              <a:t>10/03/2020</a:t>
             </a:fld>
             <a:endParaRPr lang="pt-BR"/>
           </a:p>
@@ -2683,7 +2689,7 @@
           <a:p>
             <a:fld id="{94E91461-1597-4FD2-957C-70C5CCB9C0B0}" type="datetimeFigureOut">
               <a:rPr lang="pt-BR" smtClean="0"/>
-              <a:t>06/03/2020</a:t>
+              <a:t>10/03/2020</a:t>
             </a:fld>
             <a:endParaRPr lang="pt-BR"/>
           </a:p>
@@ -2926,7 +2932,7 @@
           <a:p>
             <a:fld id="{94E91461-1597-4FD2-957C-70C5CCB9C0B0}" type="datetimeFigureOut">
               <a:rPr lang="pt-BR" smtClean="0"/>
-              <a:t>06/03/2020</a:t>
+              <a:t>10/03/2020</a:t>
             </a:fld>
             <a:endParaRPr lang="pt-BR"/>
           </a:p>
@@ -3352,13 +3358,15 @@
               </a:ext>
             </a:extLst>
           </p:cNvPr>
-          <p:cNvCxnSpPr/>
+          <p:cNvCxnSpPr>
+            <a:cxnSpLocks/>
+          </p:cNvCxnSpPr>
           <p:nvPr/>
         </p:nvCxnSpPr>
         <p:spPr>
           <a:xfrm flipH="1">
             <a:off x="0" y="0"/>
-            <a:ext cx="12192000" cy="6858000"/>
+            <a:ext cx="12192000" cy="4836179"/>
           </a:xfrm>
           <a:prstGeom prst="line">
             <a:avLst/>
@@ -3404,7 +3412,7 @@
         <p:spPr>
           <a:xfrm flipH="1" flipV="1">
             <a:off x="0" y="0"/>
-            <a:ext cx="12192000" cy="6858000"/>
+            <a:ext cx="12192000" cy="4836179"/>
           </a:xfrm>
           <a:prstGeom prst="line">
             <a:avLst/>
@@ -3517,7 +3525,7 @@
         </p:nvSpPr>
         <p:spPr>
           <a:xfrm>
-            <a:off x="5266798" y="6488668"/>
+            <a:off x="5266798" y="4463895"/>
             <a:ext cx="1658403" cy="369332"/>
           </a:xfrm>
           <a:prstGeom prst="rect">
@@ -3587,7 +3595,7 @@
         </p:nvSpPr>
         <p:spPr>
           <a:xfrm>
-            <a:off x="2756450" y="369332"/>
+            <a:off x="2756449" y="109618"/>
             <a:ext cx="1881809" cy="914400"/>
           </a:xfrm>
           <a:prstGeom prst="rect">
@@ -3651,7 +3659,7 @@
         </p:nvSpPr>
         <p:spPr>
           <a:xfrm>
-            <a:off x="638700" y="1789907"/>
+            <a:off x="189335" y="1315134"/>
             <a:ext cx="1881809" cy="914400"/>
           </a:xfrm>
           <a:prstGeom prst="rect">
@@ -3731,8 +3739,8 @@
         </p:nvSpPr>
         <p:spPr>
           <a:xfrm>
-            <a:off x="2756449" y="5574268"/>
-            <a:ext cx="1881809" cy="914400"/>
+            <a:off x="3604177" y="3558858"/>
+            <a:ext cx="1298714" cy="914400"/>
           </a:xfrm>
           <a:prstGeom prst="rect">
             <a:avLst/>
@@ -3771,7 +3779,7 @@
           <a:p>
             <a:pPr algn="ctr"/>
             <a:r>
-              <a:rPr lang="pt-BR" sz="1600" b="1" dirty="0">
+              <a:rPr lang="pt-BR" sz="1400" b="1" dirty="0">
                 <a:solidFill>
                   <a:schemeClr val="tx1"/>
                 </a:solidFill>
@@ -3795,7 +3803,7 @@
         </p:nvSpPr>
         <p:spPr>
           <a:xfrm>
-            <a:off x="10120856" y="1315134"/>
+            <a:off x="10220556" y="1043681"/>
             <a:ext cx="1881809" cy="914400"/>
           </a:xfrm>
           <a:prstGeom prst="rect">
@@ -3859,7 +3867,7 @@
         </p:nvSpPr>
         <p:spPr>
           <a:xfrm>
-            <a:off x="5060428" y="650221"/>
+            <a:off x="5060428" y="509776"/>
             <a:ext cx="1881809" cy="914400"/>
           </a:xfrm>
           <a:prstGeom prst="rect">
@@ -3923,7 +3931,7 @@
         </p:nvSpPr>
         <p:spPr>
           <a:xfrm>
-            <a:off x="7178187" y="400734"/>
+            <a:off x="7364407" y="120925"/>
             <a:ext cx="1881809" cy="914400"/>
           </a:xfrm>
           <a:prstGeom prst="rect">
@@ -3987,7 +3995,7 @@
         </p:nvSpPr>
         <p:spPr>
           <a:xfrm>
-            <a:off x="9345266" y="3847164"/>
+            <a:off x="7800431" y="1927543"/>
             <a:ext cx="1881809" cy="914400"/>
           </a:xfrm>
           <a:prstGeom prst="rect">
@@ -4051,7 +4059,7 @@
         </p:nvSpPr>
         <p:spPr>
           <a:xfrm>
-            <a:off x="8391447" y="2532030"/>
+            <a:off x="10120856" y="2103207"/>
             <a:ext cx="1881809" cy="914400"/>
           </a:xfrm>
           <a:prstGeom prst="rect">
@@ -4115,7 +4123,7 @@
         </p:nvSpPr>
         <p:spPr>
           <a:xfrm>
-            <a:off x="4634473" y="4378979"/>
+            <a:off x="5178402" y="3256380"/>
             <a:ext cx="1881809" cy="914400"/>
           </a:xfrm>
           <a:prstGeom prst="rect">
@@ -4155,7 +4163,7 @@
           <a:p>
             <a:pPr algn="ctr"/>
             <a:r>
-              <a:rPr lang="pt-BR" sz="1600" b="1" dirty="0">
+              <a:rPr lang="pt-BR" sz="1400" b="1" dirty="0">
                 <a:solidFill>
                   <a:schemeClr val="tx1"/>
                 </a:solidFill>
@@ -4179,7 +4187,7 @@
         </p:nvSpPr>
         <p:spPr>
           <a:xfrm>
-            <a:off x="6859527" y="4976624"/>
+            <a:off x="7320849" y="3734161"/>
             <a:ext cx="1881809" cy="914400"/>
           </a:xfrm>
           <a:prstGeom prst="rect">
@@ -4219,7 +4227,7 @@
           <a:p>
             <a:pPr algn="ctr"/>
             <a:r>
-              <a:rPr lang="pt-BR" sz="1600" b="1" dirty="0">
+              <a:rPr lang="pt-BR" sz="1400" b="1" dirty="0">
                 <a:solidFill>
                   <a:schemeClr val="tx1"/>
                 </a:solidFill>
@@ -4243,7 +4251,7 @@
         </p:nvSpPr>
         <p:spPr>
           <a:xfrm>
-            <a:off x="336496" y="3696493"/>
+            <a:off x="2260477" y="1960889"/>
             <a:ext cx="1881809" cy="914400"/>
           </a:xfrm>
           <a:prstGeom prst="rect">
@@ -4307,7 +4315,7 @@
         </p:nvSpPr>
         <p:spPr>
           <a:xfrm>
-            <a:off x="2475425" y="2903378"/>
+            <a:off x="189334" y="2326387"/>
             <a:ext cx="1881809" cy="914400"/>
           </a:xfrm>
           <a:prstGeom prst="rect">
@@ -4353,6 +4361,824 @@
                 </a:solidFill>
               </a:rPr>
               <a:t>Que a arte não é uma carreira a ser seguida</a:t>
+            </a:r>
+          </a:p>
+        </p:txBody>
+      </p:sp>
+      <p:cxnSp>
+        <p:nvCxnSpPr>
+          <p:cNvPr id="25" name="Conexão reta 24">
+            <a:extLst>
+              <a:ext uri="{FF2B5EF4-FFF2-40B4-BE49-F238E27FC236}">
+                <a16:creationId xmlns:a16="http://schemas.microsoft.com/office/drawing/2014/main" id="{933EE7A2-9084-4174-8C4D-BAFE671E86CE}"/>
+              </a:ext>
+            </a:extLst>
+          </p:cNvPr>
+          <p:cNvCxnSpPr>
+            <a:cxnSpLocks/>
+          </p:cNvCxnSpPr>
+          <p:nvPr/>
+        </p:nvCxnSpPr>
+        <p:spPr>
+          <a:xfrm flipH="1">
+            <a:off x="0" y="4833227"/>
+            <a:ext cx="12192000" cy="0"/>
+          </a:xfrm>
+          <a:prstGeom prst="line">
+            <a:avLst/>
+          </a:prstGeom>
+          <a:ln>
+            <a:solidFill>
+              <a:schemeClr val="tx1">
+                <a:lumMod val="85000"/>
+                <a:lumOff val="15000"/>
+              </a:schemeClr>
+            </a:solidFill>
+          </a:ln>
+        </p:spPr>
+        <p:style>
+          <a:lnRef idx="1">
+            <a:schemeClr val="accent1"/>
+          </a:lnRef>
+          <a:fillRef idx="0">
+            <a:schemeClr val="accent1"/>
+          </a:fillRef>
+          <a:effectRef idx="0">
+            <a:schemeClr val="accent1"/>
+          </a:effectRef>
+          <a:fontRef idx="minor">
+            <a:schemeClr val="tx1"/>
+          </a:fontRef>
+        </p:style>
+      </p:cxnSp>
+      <p:cxnSp>
+        <p:nvCxnSpPr>
+          <p:cNvPr id="26" name="Conexão reta 25">
+            <a:extLst>
+              <a:ext uri="{FF2B5EF4-FFF2-40B4-BE49-F238E27FC236}">
+                <a16:creationId xmlns:a16="http://schemas.microsoft.com/office/drawing/2014/main" id="{AC1C7B3A-BB11-4604-97E0-C4C7DB8FEAED}"/>
+              </a:ext>
+            </a:extLst>
+          </p:cNvPr>
+          <p:cNvCxnSpPr>
+            <a:cxnSpLocks/>
+            <a:endCxn id="11" idx="2"/>
+          </p:cNvCxnSpPr>
+          <p:nvPr/>
+        </p:nvCxnSpPr>
+        <p:spPr>
+          <a:xfrm flipV="1">
+            <a:off x="6095999" y="4833227"/>
+            <a:ext cx="1" cy="2024773"/>
+          </a:xfrm>
+          <a:prstGeom prst="line">
+            <a:avLst/>
+          </a:prstGeom>
+          <a:ln>
+            <a:solidFill>
+              <a:schemeClr val="tx1">
+                <a:lumMod val="85000"/>
+                <a:lumOff val="15000"/>
+              </a:schemeClr>
+            </a:solidFill>
+          </a:ln>
+        </p:spPr>
+        <p:style>
+          <a:lnRef idx="1">
+            <a:schemeClr val="accent1"/>
+          </a:lnRef>
+          <a:fillRef idx="0">
+            <a:schemeClr val="accent1"/>
+          </a:fillRef>
+          <a:effectRef idx="0">
+            <a:schemeClr val="accent1"/>
+          </a:effectRef>
+          <a:fontRef idx="minor">
+            <a:schemeClr val="tx1"/>
+          </a:fontRef>
+        </p:style>
+      </p:cxnSp>
+      <p:sp>
+        <p:nvSpPr>
+          <p:cNvPr id="29" name="Retângulo 28">
+            <a:extLst>
+              <a:ext uri="{FF2B5EF4-FFF2-40B4-BE49-F238E27FC236}">
+                <a16:creationId xmlns:a16="http://schemas.microsoft.com/office/drawing/2014/main" id="{BE36046E-1045-42DF-8C84-395432EE8EBE}"/>
+              </a:ext>
+            </a:extLst>
+          </p:cNvPr>
+          <p:cNvSpPr/>
+          <p:nvPr/>
+        </p:nvSpPr>
+        <p:spPr>
+          <a:xfrm>
+            <a:off x="-1" y="4839726"/>
+            <a:ext cx="1952586" cy="400110"/>
+          </a:xfrm>
+          <a:prstGeom prst="rect">
+            <a:avLst/>
+          </a:prstGeom>
+          <a:noFill/>
+        </p:spPr>
+        <p:txBody>
+          <a:bodyPr wrap="none" lIns="91440" tIns="45720" rIns="91440" bIns="45720">
+            <a:spAutoFit/>
+          </a:bodyPr>
+          <a:lstStyle/>
+          <a:p>
+            <a:pPr algn="ctr"/>
+            <a:r>
+              <a:rPr lang="pt-PT" sz="2000" b="0" cap="none" spc="0" dirty="0">
+                <a:ln w="0"/>
+                <a:solidFill>
+                  <a:srgbClr val="C00000"/>
+                </a:solidFill>
+                <a:effectLst>
+                  <a:outerShdw blurRad="38100" dist="19050" dir="2700000" algn="tl" rotWithShape="0">
+                    <a:schemeClr val="dk1">
+                      <a:alpha val="40000"/>
+                    </a:schemeClr>
+                  </a:outerShdw>
+                </a:effectLst>
+                <a:latin typeface="Segoe UI "/>
+                <a:ea typeface="Segoe UI Black" panose="020B0A02040204020203" pitchFamily="34" charset="0"/>
+                <a:cs typeface="Segoe UI Light" panose="020B0502040204020203" pitchFamily="34" charset="0"/>
+              </a:rPr>
+              <a:t>Quais as dores?</a:t>
+            </a:r>
+          </a:p>
+        </p:txBody>
+      </p:sp>
+      <p:sp>
+        <p:nvSpPr>
+          <p:cNvPr id="30" name="Retângulo 29">
+            <a:extLst>
+              <a:ext uri="{FF2B5EF4-FFF2-40B4-BE49-F238E27FC236}">
+                <a16:creationId xmlns:a16="http://schemas.microsoft.com/office/drawing/2014/main" id="{0F364C30-48E7-4454-B52E-E13FFE735D64}"/>
+              </a:ext>
+            </a:extLst>
+          </p:cNvPr>
+          <p:cNvSpPr/>
+          <p:nvPr/>
+        </p:nvSpPr>
+        <p:spPr>
+          <a:xfrm>
+            <a:off x="6095999" y="4842362"/>
+            <a:ext cx="2810385" cy="400110"/>
+          </a:xfrm>
+          <a:prstGeom prst="rect">
+            <a:avLst/>
+          </a:prstGeom>
+          <a:noFill/>
+        </p:spPr>
+        <p:txBody>
+          <a:bodyPr wrap="none" lIns="91440" tIns="45720" rIns="91440" bIns="45720">
+            <a:spAutoFit/>
+          </a:bodyPr>
+          <a:lstStyle/>
+          <a:p>
+            <a:pPr algn="ctr"/>
+            <a:r>
+              <a:rPr lang="pt-PT" sz="2000" b="0" cap="none" spc="0" dirty="0">
+                <a:ln w="0"/>
+                <a:solidFill>
+                  <a:srgbClr val="C00000"/>
+                </a:solidFill>
+                <a:effectLst>
+                  <a:outerShdw blurRad="38100" dist="19050" dir="2700000" algn="tl" rotWithShape="0">
+                    <a:schemeClr val="dk1">
+                      <a:alpha val="40000"/>
+                    </a:schemeClr>
+                  </a:outerShdw>
+                </a:effectLst>
+                <a:latin typeface="Segoe UI "/>
+                <a:ea typeface="Segoe UI Black" panose="020B0A02040204020203" pitchFamily="34" charset="0"/>
+                <a:cs typeface="Segoe UI Light" panose="020B0502040204020203" pitchFamily="34" charset="0"/>
+              </a:rPr>
+              <a:t>Quais as necessidades?</a:t>
+            </a:r>
+          </a:p>
+        </p:txBody>
+      </p:sp>
+      <p:sp>
+        <p:nvSpPr>
+          <p:cNvPr id="31" name="Retângulo 30">
+            <a:extLst>
+              <a:ext uri="{FF2B5EF4-FFF2-40B4-BE49-F238E27FC236}">
+                <a16:creationId xmlns:a16="http://schemas.microsoft.com/office/drawing/2014/main" id="{306ED3B3-AE42-4D64-B909-70ECBF9D0EFD}"/>
+              </a:ext>
+            </a:extLst>
+          </p:cNvPr>
+          <p:cNvSpPr/>
+          <p:nvPr/>
+        </p:nvSpPr>
+        <p:spPr>
+          <a:xfrm>
+            <a:off x="366223" y="5638585"/>
+            <a:ext cx="1528029" cy="742493"/>
+          </a:xfrm>
+          <a:prstGeom prst="rect">
+            <a:avLst/>
+          </a:prstGeom>
+          <a:solidFill>
+            <a:srgbClr val="FFC000"/>
+          </a:solidFill>
+          <a:ln>
+            <a:solidFill>
+              <a:schemeClr val="tx1">
+                <a:lumMod val="50000"/>
+                <a:lumOff val="50000"/>
+              </a:schemeClr>
+            </a:solidFill>
+          </a:ln>
+        </p:spPr>
+        <p:style>
+          <a:lnRef idx="2">
+            <a:schemeClr val="accent1">
+              <a:shade val="50000"/>
+            </a:schemeClr>
+          </a:lnRef>
+          <a:fillRef idx="1">
+            <a:schemeClr val="accent1"/>
+          </a:fillRef>
+          <a:effectRef idx="0">
+            <a:schemeClr val="accent1"/>
+          </a:effectRef>
+          <a:fontRef idx="minor">
+            <a:schemeClr val="lt1"/>
+          </a:fontRef>
+        </p:style>
+        <p:txBody>
+          <a:bodyPr rtlCol="0" anchor="ctr"/>
+          <a:lstStyle/>
+          <a:p>
+            <a:pPr algn="ctr"/>
+            <a:r>
+              <a:rPr lang="pt-BR" sz="1200" b="1" dirty="0">
+                <a:solidFill>
+                  <a:schemeClr val="tx1"/>
+                </a:solidFill>
+              </a:rPr>
+              <a:t>Não tem incentivos (capital) para iniciar seus trabalhos</a:t>
+            </a:r>
+          </a:p>
+        </p:txBody>
+      </p:sp>
+      <p:sp>
+        <p:nvSpPr>
+          <p:cNvPr id="32" name="Retângulo 31">
+            <a:extLst>
+              <a:ext uri="{FF2B5EF4-FFF2-40B4-BE49-F238E27FC236}">
+                <a16:creationId xmlns:a16="http://schemas.microsoft.com/office/drawing/2014/main" id="{5F3E90BD-311F-4E47-9633-3C10F86EFBA6}"/>
+              </a:ext>
+            </a:extLst>
+          </p:cNvPr>
+          <p:cNvSpPr/>
+          <p:nvPr/>
+        </p:nvSpPr>
+        <p:spPr>
+          <a:xfrm>
+            <a:off x="2232134" y="5943642"/>
+            <a:ext cx="1528029" cy="742493"/>
+          </a:xfrm>
+          <a:prstGeom prst="rect">
+            <a:avLst/>
+          </a:prstGeom>
+          <a:solidFill>
+            <a:srgbClr val="FFC000"/>
+          </a:solidFill>
+          <a:ln>
+            <a:solidFill>
+              <a:schemeClr val="tx1">
+                <a:lumMod val="50000"/>
+                <a:lumOff val="50000"/>
+              </a:schemeClr>
+            </a:solidFill>
+          </a:ln>
+        </p:spPr>
+        <p:style>
+          <a:lnRef idx="2">
+            <a:schemeClr val="accent1">
+              <a:shade val="50000"/>
+            </a:schemeClr>
+          </a:lnRef>
+          <a:fillRef idx="1">
+            <a:schemeClr val="accent1"/>
+          </a:fillRef>
+          <a:effectRef idx="0">
+            <a:schemeClr val="accent1"/>
+          </a:effectRef>
+          <a:fontRef idx="minor">
+            <a:schemeClr val="lt1"/>
+          </a:fontRef>
+        </p:style>
+        <p:txBody>
+          <a:bodyPr rtlCol="0" anchor="ctr"/>
+          <a:lstStyle/>
+          <a:p>
+            <a:pPr algn="ctr"/>
+            <a:r>
+              <a:rPr lang="pt-BR" sz="1200" b="1" dirty="0">
+                <a:solidFill>
+                  <a:schemeClr val="tx1"/>
+                </a:solidFill>
+              </a:rPr>
+              <a:t>Não tem espaço no mercado</a:t>
+            </a:r>
+          </a:p>
+        </p:txBody>
+      </p:sp>
+      <p:sp>
+        <p:nvSpPr>
+          <p:cNvPr id="33" name="Retângulo 32">
+            <a:extLst>
+              <a:ext uri="{FF2B5EF4-FFF2-40B4-BE49-F238E27FC236}">
+                <a16:creationId xmlns:a16="http://schemas.microsoft.com/office/drawing/2014/main" id="{B75D41B6-A21E-4C36-9C2E-E5F26D10D303}"/>
+              </a:ext>
+            </a:extLst>
+          </p:cNvPr>
+          <p:cNvSpPr/>
+          <p:nvPr/>
+        </p:nvSpPr>
+        <p:spPr>
+          <a:xfrm>
+            <a:off x="4011467" y="4928782"/>
+            <a:ext cx="1528029" cy="742493"/>
+          </a:xfrm>
+          <a:prstGeom prst="rect">
+            <a:avLst/>
+          </a:prstGeom>
+          <a:solidFill>
+            <a:srgbClr val="FFC000"/>
+          </a:solidFill>
+          <a:ln>
+            <a:solidFill>
+              <a:schemeClr val="tx1">
+                <a:lumMod val="50000"/>
+                <a:lumOff val="50000"/>
+              </a:schemeClr>
+            </a:solidFill>
+          </a:ln>
+        </p:spPr>
+        <p:style>
+          <a:lnRef idx="2">
+            <a:schemeClr val="accent1">
+              <a:shade val="50000"/>
+            </a:schemeClr>
+          </a:lnRef>
+          <a:fillRef idx="1">
+            <a:schemeClr val="accent1"/>
+          </a:fillRef>
+          <a:effectRef idx="0">
+            <a:schemeClr val="accent1"/>
+          </a:effectRef>
+          <a:fontRef idx="minor">
+            <a:schemeClr val="lt1"/>
+          </a:fontRef>
+        </p:style>
+        <p:txBody>
+          <a:bodyPr rtlCol="0" anchor="ctr"/>
+          <a:lstStyle/>
+          <a:p>
+            <a:pPr algn="ctr"/>
+            <a:r>
+              <a:rPr lang="pt-BR" sz="1200" b="1" dirty="0">
+                <a:solidFill>
+                  <a:schemeClr val="tx1"/>
+                </a:solidFill>
+              </a:rPr>
+              <a:t>Sente que seu trabalho não é valorizado</a:t>
+            </a:r>
+          </a:p>
+        </p:txBody>
+      </p:sp>
+      <p:sp>
+        <p:nvSpPr>
+          <p:cNvPr id="34" name="Retângulo 33">
+            <a:extLst>
+              <a:ext uri="{FF2B5EF4-FFF2-40B4-BE49-F238E27FC236}">
+                <a16:creationId xmlns:a16="http://schemas.microsoft.com/office/drawing/2014/main" id="{273472F0-4B10-4702-AF0D-BEE157DDBC03}"/>
+              </a:ext>
+            </a:extLst>
+          </p:cNvPr>
+          <p:cNvSpPr/>
+          <p:nvPr/>
+        </p:nvSpPr>
+        <p:spPr>
+          <a:xfrm>
+            <a:off x="2263130" y="4927631"/>
+            <a:ext cx="1528029" cy="742493"/>
+          </a:xfrm>
+          <a:prstGeom prst="rect">
+            <a:avLst/>
+          </a:prstGeom>
+          <a:solidFill>
+            <a:srgbClr val="FFC000"/>
+          </a:solidFill>
+          <a:ln>
+            <a:solidFill>
+              <a:schemeClr val="tx1">
+                <a:lumMod val="50000"/>
+                <a:lumOff val="50000"/>
+              </a:schemeClr>
+            </a:solidFill>
+          </a:ln>
+        </p:spPr>
+        <p:style>
+          <a:lnRef idx="2">
+            <a:schemeClr val="accent1">
+              <a:shade val="50000"/>
+            </a:schemeClr>
+          </a:lnRef>
+          <a:fillRef idx="1">
+            <a:schemeClr val="accent1"/>
+          </a:fillRef>
+          <a:effectRef idx="0">
+            <a:schemeClr val="accent1"/>
+          </a:effectRef>
+          <a:fontRef idx="minor">
+            <a:schemeClr val="lt1"/>
+          </a:fontRef>
+        </p:style>
+        <p:txBody>
+          <a:bodyPr rtlCol="0" anchor="ctr"/>
+          <a:lstStyle/>
+          <a:p>
+            <a:pPr algn="ctr"/>
+            <a:r>
+              <a:rPr lang="pt-BR" sz="1200" b="1" dirty="0">
+                <a:solidFill>
+                  <a:schemeClr val="tx1"/>
+                </a:solidFill>
+              </a:rPr>
+              <a:t>O mercado da arte é muito fechado/ elitizado</a:t>
+            </a:r>
+          </a:p>
+        </p:txBody>
+      </p:sp>
+      <p:sp>
+        <p:nvSpPr>
+          <p:cNvPr id="35" name="Retângulo 34">
+            <a:extLst>
+              <a:ext uri="{FF2B5EF4-FFF2-40B4-BE49-F238E27FC236}">
+                <a16:creationId xmlns:a16="http://schemas.microsoft.com/office/drawing/2014/main" id="{685E9C2D-A396-4A08-A150-5E5E131F2D2A}"/>
+              </a:ext>
+            </a:extLst>
+          </p:cNvPr>
+          <p:cNvSpPr/>
+          <p:nvPr/>
+        </p:nvSpPr>
+        <p:spPr>
+          <a:xfrm>
+            <a:off x="4011468" y="5943643"/>
+            <a:ext cx="1528029" cy="742493"/>
+          </a:xfrm>
+          <a:prstGeom prst="rect">
+            <a:avLst/>
+          </a:prstGeom>
+          <a:solidFill>
+            <a:srgbClr val="FFC000"/>
+          </a:solidFill>
+          <a:ln>
+            <a:solidFill>
+              <a:schemeClr val="tx1">
+                <a:lumMod val="50000"/>
+                <a:lumOff val="50000"/>
+              </a:schemeClr>
+            </a:solidFill>
+          </a:ln>
+        </p:spPr>
+        <p:style>
+          <a:lnRef idx="2">
+            <a:schemeClr val="accent1">
+              <a:shade val="50000"/>
+            </a:schemeClr>
+          </a:lnRef>
+          <a:fillRef idx="1">
+            <a:schemeClr val="accent1"/>
+          </a:fillRef>
+          <a:effectRef idx="0">
+            <a:schemeClr val="accent1"/>
+          </a:effectRef>
+          <a:fontRef idx="minor">
+            <a:schemeClr val="lt1"/>
+          </a:fontRef>
+        </p:style>
+        <p:txBody>
+          <a:bodyPr rtlCol="0" anchor="ctr"/>
+          <a:lstStyle/>
+          <a:p>
+            <a:pPr algn="ctr"/>
+            <a:r>
+              <a:rPr lang="pt-BR" sz="1200" b="1" dirty="0">
+                <a:solidFill>
+                  <a:schemeClr val="tx1"/>
+                </a:solidFill>
+              </a:rPr>
+              <a:t>Não trabalha na área que gostaria de trabalhar (arte)</a:t>
+            </a:r>
+          </a:p>
+        </p:txBody>
+      </p:sp>
+      <p:sp>
+        <p:nvSpPr>
+          <p:cNvPr id="36" name="Retângulo 35">
+            <a:extLst>
+              <a:ext uri="{FF2B5EF4-FFF2-40B4-BE49-F238E27FC236}">
+                <a16:creationId xmlns:a16="http://schemas.microsoft.com/office/drawing/2014/main" id="{9C4507C2-CE17-4F89-8EEE-442D23F9B3F4}"/>
+              </a:ext>
+            </a:extLst>
+          </p:cNvPr>
+          <p:cNvSpPr/>
+          <p:nvPr/>
+        </p:nvSpPr>
+        <p:spPr>
+          <a:xfrm>
+            <a:off x="8248409" y="5475843"/>
+            <a:ext cx="1528029" cy="742493"/>
+          </a:xfrm>
+          <a:prstGeom prst="rect">
+            <a:avLst/>
+          </a:prstGeom>
+          <a:solidFill>
+            <a:srgbClr val="FC7774"/>
+          </a:solidFill>
+          <a:ln>
+            <a:solidFill>
+              <a:schemeClr val="tx1">
+                <a:lumMod val="50000"/>
+                <a:lumOff val="50000"/>
+              </a:schemeClr>
+            </a:solidFill>
+          </a:ln>
+        </p:spPr>
+        <p:style>
+          <a:lnRef idx="2">
+            <a:schemeClr val="accent1">
+              <a:shade val="50000"/>
+            </a:schemeClr>
+          </a:lnRef>
+          <a:fillRef idx="1">
+            <a:schemeClr val="accent1"/>
+          </a:fillRef>
+          <a:effectRef idx="0">
+            <a:schemeClr val="accent1"/>
+          </a:effectRef>
+          <a:fontRef idx="minor">
+            <a:schemeClr val="lt1"/>
+          </a:fontRef>
+        </p:style>
+        <p:txBody>
+          <a:bodyPr rtlCol="0" anchor="ctr"/>
+          <a:lstStyle/>
+          <a:p>
+            <a:pPr algn="ctr"/>
+            <a:r>
+              <a:rPr lang="pt-BR" sz="1200" b="1" dirty="0">
+                <a:solidFill>
+                  <a:schemeClr val="tx1"/>
+                </a:solidFill>
+              </a:rPr>
+              <a:t>Capital para seus projetos (e viver)</a:t>
+            </a:r>
+          </a:p>
+        </p:txBody>
+      </p:sp>
+      <p:sp>
+        <p:nvSpPr>
+          <p:cNvPr id="37" name="Retângulo 36">
+            <a:extLst>
+              <a:ext uri="{FF2B5EF4-FFF2-40B4-BE49-F238E27FC236}">
+                <a16:creationId xmlns:a16="http://schemas.microsoft.com/office/drawing/2014/main" id="{4DD1A9A6-DE5D-4226-AA85-D920BC7FD78F}"/>
+              </a:ext>
+            </a:extLst>
+          </p:cNvPr>
+          <p:cNvSpPr/>
+          <p:nvPr/>
+        </p:nvSpPr>
+        <p:spPr>
+          <a:xfrm>
+            <a:off x="10025761" y="4927630"/>
+            <a:ext cx="1528029" cy="742493"/>
+          </a:xfrm>
+          <a:prstGeom prst="rect">
+            <a:avLst/>
+          </a:prstGeom>
+          <a:solidFill>
+            <a:srgbClr val="FC7774"/>
+          </a:solidFill>
+          <a:ln>
+            <a:solidFill>
+              <a:schemeClr val="tx1">
+                <a:lumMod val="50000"/>
+                <a:lumOff val="50000"/>
+              </a:schemeClr>
+            </a:solidFill>
+          </a:ln>
+        </p:spPr>
+        <p:style>
+          <a:lnRef idx="2">
+            <a:schemeClr val="accent1">
+              <a:shade val="50000"/>
+            </a:schemeClr>
+          </a:lnRef>
+          <a:fillRef idx="1">
+            <a:schemeClr val="accent1"/>
+          </a:fillRef>
+          <a:effectRef idx="0">
+            <a:schemeClr val="accent1"/>
+          </a:effectRef>
+          <a:fontRef idx="minor">
+            <a:schemeClr val="lt1"/>
+          </a:fontRef>
+        </p:style>
+        <p:txBody>
+          <a:bodyPr rtlCol="0" anchor="ctr"/>
+          <a:lstStyle/>
+          <a:p>
+            <a:pPr algn="ctr"/>
+            <a:r>
+              <a:rPr lang="pt-BR" sz="1200" b="1" dirty="0">
+                <a:solidFill>
+                  <a:schemeClr val="tx1"/>
+                </a:solidFill>
+              </a:rPr>
+              <a:t>Ter um público relevante (quantidade)</a:t>
+            </a:r>
+          </a:p>
+        </p:txBody>
+      </p:sp>
+      <p:sp>
+        <p:nvSpPr>
+          <p:cNvPr id="38" name="Retângulo 37">
+            <a:extLst>
+              <a:ext uri="{FF2B5EF4-FFF2-40B4-BE49-F238E27FC236}">
+                <a16:creationId xmlns:a16="http://schemas.microsoft.com/office/drawing/2014/main" id="{60BC752E-24C6-410A-8945-0910A1988F8C}"/>
+              </a:ext>
+            </a:extLst>
+          </p:cNvPr>
+          <p:cNvSpPr/>
+          <p:nvPr/>
+        </p:nvSpPr>
+        <p:spPr>
+          <a:xfrm>
+            <a:off x="10025762" y="5943641"/>
+            <a:ext cx="1528029" cy="742493"/>
+          </a:xfrm>
+          <a:prstGeom prst="rect">
+            <a:avLst/>
+          </a:prstGeom>
+          <a:solidFill>
+            <a:srgbClr val="FC7774"/>
+          </a:solidFill>
+          <a:ln>
+            <a:solidFill>
+              <a:schemeClr val="tx1">
+                <a:lumMod val="50000"/>
+                <a:lumOff val="50000"/>
+              </a:schemeClr>
+            </a:solidFill>
+          </a:ln>
+        </p:spPr>
+        <p:style>
+          <a:lnRef idx="2">
+            <a:schemeClr val="accent1">
+              <a:shade val="50000"/>
+            </a:schemeClr>
+          </a:lnRef>
+          <a:fillRef idx="1">
+            <a:schemeClr val="accent1"/>
+          </a:fillRef>
+          <a:effectRef idx="0">
+            <a:schemeClr val="accent1"/>
+          </a:effectRef>
+          <a:fontRef idx="minor">
+            <a:schemeClr val="lt1"/>
+          </a:fontRef>
+        </p:style>
+        <p:txBody>
+          <a:bodyPr rtlCol="0" anchor="ctr"/>
+          <a:lstStyle/>
+          <a:p>
+            <a:pPr algn="ctr"/>
+            <a:r>
+              <a:rPr lang="pt-BR" sz="1200" b="1" dirty="0">
+                <a:solidFill>
+                  <a:schemeClr val="tx1"/>
+                </a:solidFill>
+              </a:rPr>
+              <a:t>Pessoas que consomem suas produções</a:t>
+            </a:r>
+          </a:p>
+        </p:txBody>
+      </p:sp>
+      <p:sp>
+        <p:nvSpPr>
+          <p:cNvPr id="39" name="Retângulo 38">
+            <a:extLst>
+              <a:ext uri="{FF2B5EF4-FFF2-40B4-BE49-F238E27FC236}">
+                <a16:creationId xmlns:a16="http://schemas.microsoft.com/office/drawing/2014/main" id="{AEBF6859-37EB-43B7-ACC3-C81D8151E99D}"/>
+              </a:ext>
+            </a:extLst>
+          </p:cNvPr>
+          <p:cNvSpPr/>
+          <p:nvPr/>
+        </p:nvSpPr>
+        <p:spPr>
+          <a:xfrm>
+            <a:off x="6408190" y="5754665"/>
+            <a:ext cx="1528029" cy="742493"/>
+          </a:xfrm>
+          <a:prstGeom prst="rect">
+            <a:avLst/>
+          </a:prstGeom>
+          <a:solidFill>
+            <a:srgbClr val="FC7774"/>
+          </a:solidFill>
+          <a:ln>
+            <a:solidFill>
+              <a:schemeClr val="tx1">
+                <a:lumMod val="50000"/>
+                <a:lumOff val="50000"/>
+              </a:schemeClr>
+            </a:solidFill>
+          </a:ln>
+        </p:spPr>
+        <p:style>
+          <a:lnRef idx="2">
+            <a:schemeClr val="accent1">
+              <a:shade val="50000"/>
+            </a:schemeClr>
+          </a:lnRef>
+          <a:fillRef idx="1">
+            <a:schemeClr val="accent1"/>
+          </a:fillRef>
+          <a:effectRef idx="0">
+            <a:schemeClr val="accent1"/>
+          </a:effectRef>
+          <a:fontRef idx="minor">
+            <a:schemeClr val="lt1"/>
+          </a:fontRef>
+        </p:style>
+        <p:txBody>
+          <a:bodyPr rtlCol="0" anchor="ctr"/>
+          <a:lstStyle/>
+          <a:p>
+            <a:pPr algn="ctr"/>
+            <a:r>
+              <a:rPr lang="pt-BR" sz="1200" b="1" dirty="0">
+                <a:solidFill>
+                  <a:schemeClr val="tx1"/>
+                </a:solidFill>
+              </a:rPr>
+              <a:t>Precisa de um meio de comunicação com seu público</a:t>
+            </a:r>
+          </a:p>
+        </p:txBody>
+      </p:sp>
+      <p:sp>
+        <p:nvSpPr>
+          <p:cNvPr id="40" name="Oval 39">
+            <a:extLst>
+              <a:ext uri="{FF2B5EF4-FFF2-40B4-BE49-F238E27FC236}">
+                <a16:creationId xmlns:a16="http://schemas.microsoft.com/office/drawing/2014/main" id="{20CE1BB0-19F4-4E0A-AF0B-345D54012290}"/>
+              </a:ext>
+            </a:extLst>
+          </p:cNvPr>
+          <p:cNvSpPr/>
+          <p:nvPr/>
+        </p:nvSpPr>
+        <p:spPr>
+          <a:xfrm>
+            <a:off x="5351975" y="1704307"/>
+            <a:ext cx="1298714" cy="1298714"/>
+          </a:xfrm>
+          <a:prstGeom prst="ellipse">
+            <a:avLst/>
+          </a:prstGeom>
+        </p:spPr>
+        <p:style>
+          <a:lnRef idx="2">
+            <a:schemeClr val="dk1"/>
+          </a:lnRef>
+          <a:fillRef idx="1">
+            <a:schemeClr val="lt1"/>
+          </a:fillRef>
+          <a:effectRef idx="0">
+            <a:schemeClr val="dk1"/>
+          </a:effectRef>
+          <a:fontRef idx="minor">
+            <a:schemeClr val="dk1"/>
+          </a:fontRef>
+        </p:style>
+        <p:txBody>
+          <a:bodyPr rtlCol="0" anchor="ctr"/>
+          <a:lstStyle/>
+          <a:p>
+            <a:pPr algn="ctr"/>
+            <a:r>
+              <a:rPr lang="pt-BR" dirty="0"/>
+              <a:t>Artista</a:t>
             </a:r>
           </a:p>
         </p:txBody>
@@ -4389,6 +5215,1724 @@
       </p:grpSpPr>
       <p:cxnSp>
         <p:nvCxnSpPr>
+          <p:cNvPr id="5" name="Conexão reta 4">
+            <a:extLst>
+              <a:ext uri="{FF2B5EF4-FFF2-40B4-BE49-F238E27FC236}">
+                <a16:creationId xmlns:a16="http://schemas.microsoft.com/office/drawing/2014/main" id="{6BEB5DF7-88D9-4A30-B4FF-9510B35D32B1}"/>
+              </a:ext>
+            </a:extLst>
+          </p:cNvPr>
+          <p:cNvCxnSpPr>
+            <a:cxnSpLocks/>
+          </p:cNvCxnSpPr>
+          <p:nvPr/>
+        </p:nvCxnSpPr>
+        <p:spPr>
+          <a:xfrm flipH="1">
+            <a:off x="0" y="0"/>
+            <a:ext cx="12192000" cy="4836179"/>
+          </a:xfrm>
+          <a:prstGeom prst="line">
+            <a:avLst/>
+          </a:prstGeom>
+          <a:ln>
+            <a:solidFill>
+              <a:schemeClr val="tx1">
+                <a:lumMod val="85000"/>
+                <a:lumOff val="15000"/>
+              </a:schemeClr>
+            </a:solidFill>
+          </a:ln>
+        </p:spPr>
+        <p:style>
+          <a:lnRef idx="1">
+            <a:schemeClr val="accent1"/>
+          </a:lnRef>
+          <a:fillRef idx="0">
+            <a:schemeClr val="accent1"/>
+          </a:fillRef>
+          <a:effectRef idx="0">
+            <a:schemeClr val="accent1"/>
+          </a:effectRef>
+          <a:fontRef idx="minor">
+            <a:schemeClr val="tx1"/>
+          </a:fontRef>
+        </p:style>
+      </p:cxnSp>
+      <p:cxnSp>
+        <p:nvCxnSpPr>
+          <p:cNvPr id="6" name="Conexão reta 5">
+            <a:extLst>
+              <a:ext uri="{FF2B5EF4-FFF2-40B4-BE49-F238E27FC236}">
+                <a16:creationId xmlns:a16="http://schemas.microsoft.com/office/drawing/2014/main" id="{D65D2EF5-E259-4F6F-8659-937321812C55}"/>
+              </a:ext>
+            </a:extLst>
+          </p:cNvPr>
+          <p:cNvCxnSpPr>
+            <a:cxnSpLocks/>
+          </p:cNvCxnSpPr>
+          <p:nvPr/>
+        </p:nvCxnSpPr>
+        <p:spPr>
+          <a:xfrm flipH="1" flipV="1">
+            <a:off x="0" y="0"/>
+            <a:ext cx="12192000" cy="4836179"/>
+          </a:xfrm>
+          <a:prstGeom prst="line">
+            <a:avLst/>
+          </a:prstGeom>
+          <a:ln>
+            <a:solidFill>
+              <a:schemeClr val="tx1">
+                <a:lumMod val="85000"/>
+                <a:lumOff val="15000"/>
+              </a:schemeClr>
+            </a:solidFill>
+          </a:ln>
+        </p:spPr>
+        <p:style>
+          <a:lnRef idx="1">
+            <a:schemeClr val="accent1"/>
+          </a:lnRef>
+          <a:fillRef idx="0">
+            <a:schemeClr val="accent1"/>
+          </a:fillRef>
+          <a:effectRef idx="0">
+            <a:schemeClr val="accent1"/>
+          </a:effectRef>
+          <a:fontRef idx="minor">
+            <a:schemeClr val="tx1"/>
+          </a:fontRef>
+        </p:style>
+      </p:cxnSp>
+      <p:sp>
+        <p:nvSpPr>
+          <p:cNvPr id="9" name="CaixaDeTexto 8">
+            <a:extLst>
+              <a:ext uri="{FF2B5EF4-FFF2-40B4-BE49-F238E27FC236}">
+                <a16:creationId xmlns:a16="http://schemas.microsoft.com/office/drawing/2014/main" id="{47586B43-5C27-489F-AC3E-32731C98C31C}"/>
+              </a:ext>
+            </a:extLst>
+          </p:cNvPr>
+          <p:cNvSpPr txBox="1"/>
+          <p:nvPr/>
+        </p:nvSpPr>
+        <p:spPr>
+          <a:xfrm>
+            <a:off x="5060428" y="0"/>
+            <a:ext cx="2117759" cy="369332"/>
+          </a:xfrm>
+          <a:prstGeom prst="rect">
+            <a:avLst/>
+          </a:prstGeom>
+          <a:noFill/>
+        </p:spPr>
+        <p:txBody>
+          <a:bodyPr wrap="none" rtlCol="0">
+            <a:spAutoFit/>
+          </a:bodyPr>
+          <a:lstStyle/>
+          <a:p>
+            <a:r>
+              <a:rPr lang="pt-BR" b="1" dirty="0"/>
+              <a:t>O que pensa e sente</a:t>
+            </a:r>
+          </a:p>
+        </p:txBody>
+      </p:sp>
+      <p:sp>
+        <p:nvSpPr>
+          <p:cNvPr id="10" name="CaixaDeTexto 9">
+            <a:extLst>
+              <a:ext uri="{FF2B5EF4-FFF2-40B4-BE49-F238E27FC236}">
+                <a16:creationId xmlns:a16="http://schemas.microsoft.com/office/drawing/2014/main" id="{FD7B9544-4860-403A-A72F-9584097799FF}"/>
+              </a:ext>
+            </a:extLst>
+          </p:cNvPr>
+          <p:cNvSpPr txBox="1"/>
+          <p:nvPr/>
+        </p:nvSpPr>
+        <p:spPr>
+          <a:xfrm>
+            <a:off x="11161461" y="3244334"/>
+            <a:ext cx="1030539" cy="369332"/>
+          </a:xfrm>
+          <a:prstGeom prst="rect">
+            <a:avLst/>
+          </a:prstGeom>
+          <a:noFill/>
+        </p:spPr>
+        <p:txBody>
+          <a:bodyPr wrap="none" rtlCol="0">
+            <a:spAutoFit/>
+          </a:bodyPr>
+          <a:lstStyle/>
+          <a:p>
+            <a:r>
+              <a:rPr lang="pt-BR" b="1" dirty="0"/>
+              <a:t>O que vê</a:t>
+            </a:r>
+          </a:p>
+        </p:txBody>
+      </p:sp>
+      <p:sp>
+        <p:nvSpPr>
+          <p:cNvPr id="11" name="CaixaDeTexto 10">
+            <a:extLst>
+              <a:ext uri="{FF2B5EF4-FFF2-40B4-BE49-F238E27FC236}">
+                <a16:creationId xmlns:a16="http://schemas.microsoft.com/office/drawing/2014/main" id="{084EEED2-E299-482C-B162-A3C4407BC2C9}"/>
+              </a:ext>
+            </a:extLst>
+          </p:cNvPr>
+          <p:cNvSpPr txBox="1"/>
+          <p:nvPr/>
+        </p:nvSpPr>
+        <p:spPr>
+          <a:xfrm>
+            <a:off x="5266798" y="4463895"/>
+            <a:ext cx="1658403" cy="369332"/>
+          </a:xfrm>
+          <a:prstGeom prst="rect">
+            <a:avLst/>
+          </a:prstGeom>
+          <a:noFill/>
+        </p:spPr>
+        <p:txBody>
+          <a:bodyPr wrap="none" rtlCol="0">
+            <a:spAutoFit/>
+          </a:bodyPr>
+          <a:lstStyle/>
+          <a:p>
+            <a:r>
+              <a:rPr lang="pt-BR" b="1" dirty="0"/>
+              <a:t>O que fala e faz</a:t>
+            </a:r>
+          </a:p>
+        </p:txBody>
+      </p:sp>
+      <p:sp>
+        <p:nvSpPr>
+          <p:cNvPr id="12" name="CaixaDeTexto 11">
+            <a:extLst>
+              <a:ext uri="{FF2B5EF4-FFF2-40B4-BE49-F238E27FC236}">
+                <a16:creationId xmlns:a16="http://schemas.microsoft.com/office/drawing/2014/main" id="{A237E447-98EC-4233-BDCA-39C1F879AE8A}"/>
+              </a:ext>
+            </a:extLst>
+          </p:cNvPr>
+          <p:cNvSpPr txBox="1"/>
+          <p:nvPr/>
+        </p:nvSpPr>
+        <p:spPr>
+          <a:xfrm>
+            <a:off x="0" y="3244334"/>
+            <a:ext cx="1277401" cy="369332"/>
+          </a:xfrm>
+          <a:prstGeom prst="rect">
+            <a:avLst/>
+          </a:prstGeom>
+          <a:noFill/>
+        </p:spPr>
+        <p:txBody>
+          <a:bodyPr wrap="none" rtlCol="0">
+            <a:spAutoFit/>
+          </a:bodyPr>
+          <a:lstStyle/>
+          <a:p>
+            <a:r>
+              <a:rPr lang="pt-BR" b="1" dirty="0"/>
+              <a:t>O que ouve</a:t>
+            </a:r>
+          </a:p>
+        </p:txBody>
+      </p:sp>
+      <p:sp>
+        <p:nvSpPr>
+          <p:cNvPr id="13" name="Retângulo 12">
+            <a:extLst>
+              <a:ext uri="{FF2B5EF4-FFF2-40B4-BE49-F238E27FC236}">
+                <a16:creationId xmlns:a16="http://schemas.microsoft.com/office/drawing/2014/main" id="{87194840-2ECD-4EF7-889B-B60F99FB6859}"/>
+              </a:ext>
+            </a:extLst>
+          </p:cNvPr>
+          <p:cNvSpPr/>
+          <p:nvPr/>
+        </p:nvSpPr>
+        <p:spPr>
+          <a:xfrm>
+            <a:off x="2756449" y="109618"/>
+            <a:ext cx="1881809" cy="914400"/>
+          </a:xfrm>
+          <a:prstGeom prst="rect">
+            <a:avLst/>
+          </a:prstGeom>
+          <a:solidFill>
+            <a:srgbClr val="00B0F0"/>
+          </a:solidFill>
+          <a:ln>
+            <a:solidFill>
+              <a:schemeClr val="tx1">
+                <a:lumMod val="50000"/>
+                <a:lumOff val="50000"/>
+              </a:schemeClr>
+            </a:solidFill>
+          </a:ln>
+        </p:spPr>
+        <p:style>
+          <a:lnRef idx="2">
+            <a:schemeClr val="accent1">
+              <a:shade val="50000"/>
+            </a:schemeClr>
+          </a:lnRef>
+          <a:fillRef idx="1">
+            <a:schemeClr val="accent1"/>
+          </a:fillRef>
+          <a:effectRef idx="0">
+            <a:schemeClr val="accent1"/>
+          </a:effectRef>
+          <a:fontRef idx="minor">
+            <a:schemeClr val="lt1"/>
+          </a:fontRef>
+        </p:style>
+        <p:txBody>
+          <a:bodyPr rtlCol="0" anchor="ctr"/>
+          <a:lstStyle/>
+          <a:p>
+            <a:pPr algn="ctr"/>
+            <a:r>
+              <a:rPr lang="pt-BR" sz="1400" b="1" dirty="0">
+                <a:solidFill>
+                  <a:schemeClr val="tx1"/>
+                </a:solidFill>
+              </a:rPr>
+              <a:t>A arte gera empatia e que isso melhora a sociedade como um todo</a:t>
+            </a:r>
+          </a:p>
+        </p:txBody>
+      </p:sp>
+      <p:sp>
+        <p:nvSpPr>
+          <p:cNvPr id="14" name="Retângulo 13">
+            <a:extLst>
+              <a:ext uri="{FF2B5EF4-FFF2-40B4-BE49-F238E27FC236}">
+                <a16:creationId xmlns:a16="http://schemas.microsoft.com/office/drawing/2014/main" id="{85F48C31-FA66-4ED0-9F77-C19F5A4EE05D}"/>
+              </a:ext>
+            </a:extLst>
+          </p:cNvPr>
+          <p:cNvSpPr/>
+          <p:nvPr/>
+        </p:nvSpPr>
+        <p:spPr>
+          <a:xfrm>
+            <a:off x="189335" y="1315134"/>
+            <a:ext cx="1881809" cy="914400"/>
+          </a:xfrm>
+          <a:prstGeom prst="rect">
+            <a:avLst/>
+          </a:prstGeom>
+          <a:solidFill>
+            <a:srgbClr val="FFFF00"/>
+          </a:solidFill>
+          <a:ln>
+            <a:solidFill>
+              <a:schemeClr val="tx1">
+                <a:lumMod val="50000"/>
+                <a:lumOff val="50000"/>
+              </a:schemeClr>
+            </a:solidFill>
+          </a:ln>
+        </p:spPr>
+        <p:style>
+          <a:lnRef idx="2">
+            <a:schemeClr val="accent1">
+              <a:shade val="50000"/>
+            </a:schemeClr>
+          </a:lnRef>
+          <a:fillRef idx="1">
+            <a:schemeClr val="accent1"/>
+          </a:fillRef>
+          <a:effectRef idx="0">
+            <a:schemeClr val="accent1"/>
+          </a:effectRef>
+          <a:fontRef idx="minor">
+            <a:schemeClr val="lt1"/>
+          </a:fontRef>
+        </p:style>
+        <p:txBody>
+          <a:bodyPr rtlCol="0" anchor="ctr"/>
+          <a:lstStyle/>
+          <a:p>
+            <a:pPr algn="ctr"/>
+            <a:r>
+              <a:rPr lang="pt-BR" sz="1400" b="1" dirty="0">
+                <a:solidFill>
+                  <a:schemeClr val="tx1"/>
+                </a:solidFill>
+              </a:rPr>
+              <a:t>Sobre a importância das conexões humanas</a:t>
+            </a:r>
+          </a:p>
+        </p:txBody>
+      </p:sp>
+      <p:sp>
+        <p:nvSpPr>
+          <p:cNvPr id="15" name="Retângulo 14">
+            <a:extLst>
+              <a:ext uri="{FF2B5EF4-FFF2-40B4-BE49-F238E27FC236}">
+                <a16:creationId xmlns:a16="http://schemas.microsoft.com/office/drawing/2014/main" id="{8FC487EE-E6AE-4A32-BC9D-1154F52BA8DA}"/>
+              </a:ext>
+            </a:extLst>
+          </p:cNvPr>
+          <p:cNvSpPr/>
+          <p:nvPr/>
+        </p:nvSpPr>
+        <p:spPr>
+          <a:xfrm>
+            <a:off x="3604177" y="3558858"/>
+            <a:ext cx="1298714" cy="914400"/>
+          </a:xfrm>
+          <a:prstGeom prst="rect">
+            <a:avLst/>
+          </a:prstGeom>
+          <a:solidFill>
+            <a:schemeClr val="accent6"/>
+          </a:solidFill>
+          <a:ln>
+            <a:solidFill>
+              <a:schemeClr val="tx1">
+                <a:lumMod val="50000"/>
+                <a:lumOff val="50000"/>
+              </a:schemeClr>
+            </a:solidFill>
+          </a:ln>
+        </p:spPr>
+        <p:style>
+          <a:lnRef idx="2">
+            <a:schemeClr val="accent1">
+              <a:shade val="50000"/>
+            </a:schemeClr>
+          </a:lnRef>
+          <a:fillRef idx="1">
+            <a:schemeClr val="accent1"/>
+          </a:fillRef>
+          <a:effectRef idx="0">
+            <a:schemeClr val="accent1"/>
+          </a:effectRef>
+          <a:fontRef idx="minor">
+            <a:schemeClr val="lt1"/>
+          </a:fontRef>
+        </p:style>
+        <p:txBody>
+          <a:bodyPr rtlCol="0" anchor="ctr"/>
+          <a:lstStyle/>
+          <a:p>
+            <a:pPr algn="ctr"/>
+            <a:endParaRPr lang="pt-BR" sz="1400" b="1" dirty="0">
+              <a:solidFill>
+                <a:schemeClr val="tx1"/>
+              </a:solidFill>
+            </a:endParaRPr>
+          </a:p>
+        </p:txBody>
+      </p:sp>
+      <p:sp>
+        <p:nvSpPr>
+          <p:cNvPr id="16" name="Retângulo 15">
+            <a:extLst>
+              <a:ext uri="{FF2B5EF4-FFF2-40B4-BE49-F238E27FC236}">
+                <a16:creationId xmlns:a16="http://schemas.microsoft.com/office/drawing/2014/main" id="{0CCFEC38-4DF1-4B2B-A7A9-E36916FF7DE8}"/>
+              </a:ext>
+            </a:extLst>
+          </p:cNvPr>
+          <p:cNvSpPr/>
+          <p:nvPr/>
+        </p:nvSpPr>
+        <p:spPr>
+          <a:xfrm>
+            <a:off x="10223068" y="842133"/>
+            <a:ext cx="1881809" cy="914400"/>
+          </a:xfrm>
+          <a:prstGeom prst="rect">
+            <a:avLst/>
+          </a:prstGeom>
+          <a:solidFill>
+            <a:srgbClr val="7030A0"/>
+          </a:solidFill>
+          <a:ln>
+            <a:solidFill>
+              <a:schemeClr val="tx1">
+                <a:lumMod val="50000"/>
+                <a:lumOff val="50000"/>
+              </a:schemeClr>
+            </a:solidFill>
+          </a:ln>
+        </p:spPr>
+        <p:style>
+          <a:lnRef idx="2">
+            <a:schemeClr val="accent1">
+              <a:shade val="50000"/>
+            </a:schemeClr>
+          </a:lnRef>
+          <a:fillRef idx="1">
+            <a:schemeClr val="accent1"/>
+          </a:fillRef>
+          <a:effectRef idx="0">
+            <a:schemeClr val="accent1"/>
+          </a:effectRef>
+          <a:fontRef idx="minor">
+            <a:schemeClr val="lt1"/>
+          </a:fontRef>
+        </p:style>
+        <p:txBody>
+          <a:bodyPr rtlCol="0" anchor="ctr"/>
+          <a:lstStyle/>
+          <a:p>
+            <a:pPr algn="ctr"/>
+            <a:r>
+              <a:rPr lang="pt-BR" sz="1400" b="1" dirty="0">
+                <a:solidFill>
+                  <a:schemeClr val="bg1"/>
+                </a:solidFill>
+              </a:rPr>
+              <a:t>Usa </a:t>
+            </a:r>
+            <a:r>
+              <a:rPr lang="pt-BR" sz="1400" b="1" dirty="0" err="1">
+                <a:solidFill>
+                  <a:schemeClr val="bg1"/>
+                </a:solidFill>
+              </a:rPr>
+              <a:t>tumblr</a:t>
+            </a:r>
+            <a:endParaRPr lang="pt-BR" sz="1400" b="1" dirty="0">
+              <a:solidFill>
+                <a:schemeClr val="bg1"/>
+              </a:solidFill>
+            </a:endParaRPr>
+          </a:p>
+        </p:txBody>
+      </p:sp>
+      <p:sp>
+        <p:nvSpPr>
+          <p:cNvPr id="17" name="Retângulo 16">
+            <a:extLst>
+              <a:ext uri="{FF2B5EF4-FFF2-40B4-BE49-F238E27FC236}">
+                <a16:creationId xmlns:a16="http://schemas.microsoft.com/office/drawing/2014/main" id="{9E7F8CEC-67D9-4E4F-8B73-247A64927758}"/>
+              </a:ext>
+            </a:extLst>
+          </p:cNvPr>
+          <p:cNvSpPr/>
+          <p:nvPr/>
+        </p:nvSpPr>
+        <p:spPr>
+          <a:xfrm>
+            <a:off x="5060428" y="509776"/>
+            <a:ext cx="1881809" cy="914400"/>
+          </a:xfrm>
+          <a:prstGeom prst="rect">
+            <a:avLst/>
+          </a:prstGeom>
+          <a:solidFill>
+            <a:srgbClr val="00B0F0"/>
+          </a:solidFill>
+          <a:ln>
+            <a:solidFill>
+              <a:schemeClr val="tx1">
+                <a:lumMod val="50000"/>
+                <a:lumOff val="50000"/>
+              </a:schemeClr>
+            </a:solidFill>
+          </a:ln>
+        </p:spPr>
+        <p:style>
+          <a:lnRef idx="2">
+            <a:schemeClr val="accent1">
+              <a:shade val="50000"/>
+            </a:schemeClr>
+          </a:lnRef>
+          <a:fillRef idx="1">
+            <a:schemeClr val="accent1"/>
+          </a:fillRef>
+          <a:effectRef idx="0">
+            <a:schemeClr val="accent1"/>
+          </a:effectRef>
+          <a:fontRef idx="minor">
+            <a:schemeClr val="lt1"/>
+          </a:fontRef>
+        </p:style>
+        <p:txBody>
+          <a:bodyPr rtlCol="0" anchor="ctr"/>
+          <a:lstStyle/>
+          <a:p>
+            <a:pPr algn="ctr"/>
+            <a:r>
+              <a:rPr lang="pt-BR" sz="1400" b="1" dirty="0">
+                <a:solidFill>
+                  <a:schemeClr val="tx1"/>
+                </a:solidFill>
+              </a:rPr>
+              <a:t>Estamos limitados ao consumir só o que nos é imposto</a:t>
+            </a:r>
+          </a:p>
+        </p:txBody>
+      </p:sp>
+      <p:sp>
+        <p:nvSpPr>
+          <p:cNvPr id="18" name="Retângulo 17">
+            <a:extLst>
+              <a:ext uri="{FF2B5EF4-FFF2-40B4-BE49-F238E27FC236}">
+                <a16:creationId xmlns:a16="http://schemas.microsoft.com/office/drawing/2014/main" id="{E4CDE25B-A933-4C52-A46D-B536D64EECA6}"/>
+              </a:ext>
+            </a:extLst>
+          </p:cNvPr>
+          <p:cNvSpPr/>
+          <p:nvPr/>
+        </p:nvSpPr>
+        <p:spPr>
+          <a:xfrm>
+            <a:off x="7364407" y="120925"/>
+            <a:ext cx="1881809" cy="914400"/>
+          </a:xfrm>
+          <a:prstGeom prst="rect">
+            <a:avLst/>
+          </a:prstGeom>
+          <a:solidFill>
+            <a:srgbClr val="00B0F0"/>
+          </a:solidFill>
+          <a:ln>
+            <a:solidFill>
+              <a:schemeClr val="tx1">
+                <a:lumMod val="50000"/>
+                <a:lumOff val="50000"/>
+              </a:schemeClr>
+            </a:solidFill>
+          </a:ln>
+        </p:spPr>
+        <p:style>
+          <a:lnRef idx="2">
+            <a:schemeClr val="accent1">
+              <a:shade val="50000"/>
+            </a:schemeClr>
+          </a:lnRef>
+          <a:fillRef idx="1">
+            <a:schemeClr val="accent1"/>
+          </a:fillRef>
+          <a:effectRef idx="0">
+            <a:schemeClr val="accent1"/>
+          </a:effectRef>
+          <a:fontRef idx="minor">
+            <a:schemeClr val="lt1"/>
+          </a:fontRef>
+        </p:style>
+        <p:txBody>
+          <a:bodyPr rtlCol="0" anchor="ctr"/>
+          <a:lstStyle/>
+          <a:p>
+            <a:pPr algn="ctr"/>
+            <a:r>
+              <a:rPr lang="pt-BR" sz="1400" b="1" dirty="0">
+                <a:solidFill>
+                  <a:schemeClr val="tx1"/>
+                </a:solidFill>
+              </a:rPr>
+              <a:t>As pessoas precisam apreciar mais a beleza no/do mundo</a:t>
+            </a:r>
+          </a:p>
+        </p:txBody>
+      </p:sp>
+      <p:sp>
+        <p:nvSpPr>
+          <p:cNvPr id="19" name="Retângulo 18">
+            <a:extLst>
+              <a:ext uri="{FF2B5EF4-FFF2-40B4-BE49-F238E27FC236}">
+                <a16:creationId xmlns:a16="http://schemas.microsoft.com/office/drawing/2014/main" id="{1DC36F20-34CF-409C-A1B5-7E27D4FA6306}"/>
+              </a:ext>
+            </a:extLst>
+          </p:cNvPr>
+          <p:cNvSpPr/>
+          <p:nvPr/>
+        </p:nvSpPr>
+        <p:spPr>
+          <a:xfrm>
+            <a:off x="7800431" y="1927543"/>
+            <a:ext cx="1881809" cy="914400"/>
+          </a:xfrm>
+          <a:prstGeom prst="rect">
+            <a:avLst/>
+          </a:prstGeom>
+          <a:solidFill>
+            <a:srgbClr val="7030A0"/>
+          </a:solidFill>
+          <a:ln>
+            <a:solidFill>
+              <a:schemeClr val="tx1">
+                <a:lumMod val="50000"/>
+                <a:lumOff val="50000"/>
+              </a:schemeClr>
+            </a:solidFill>
+          </a:ln>
+        </p:spPr>
+        <p:style>
+          <a:lnRef idx="2">
+            <a:schemeClr val="accent1">
+              <a:shade val="50000"/>
+            </a:schemeClr>
+          </a:lnRef>
+          <a:fillRef idx="1">
+            <a:schemeClr val="accent1"/>
+          </a:fillRef>
+          <a:effectRef idx="0">
+            <a:schemeClr val="accent1"/>
+          </a:effectRef>
+          <a:fontRef idx="minor">
+            <a:schemeClr val="lt1"/>
+          </a:fontRef>
+        </p:style>
+        <p:txBody>
+          <a:bodyPr rtlCol="0" anchor="ctr"/>
+          <a:lstStyle/>
+          <a:p>
+            <a:pPr algn="ctr"/>
+            <a:r>
+              <a:rPr lang="pt-BR" sz="1400" b="1" dirty="0">
+                <a:solidFill>
+                  <a:schemeClr val="bg1"/>
+                </a:solidFill>
+              </a:rPr>
+              <a:t>Diversidade de Pessoas</a:t>
+            </a:r>
+          </a:p>
+        </p:txBody>
+      </p:sp>
+      <p:sp>
+        <p:nvSpPr>
+          <p:cNvPr id="20" name="Retângulo 19">
+            <a:extLst>
+              <a:ext uri="{FF2B5EF4-FFF2-40B4-BE49-F238E27FC236}">
+                <a16:creationId xmlns:a16="http://schemas.microsoft.com/office/drawing/2014/main" id="{E76A26BF-ABA7-442B-9BE7-684B32361D06}"/>
+              </a:ext>
+            </a:extLst>
+          </p:cNvPr>
+          <p:cNvSpPr/>
+          <p:nvPr/>
+        </p:nvSpPr>
+        <p:spPr>
+          <a:xfrm>
+            <a:off x="10120856" y="2103207"/>
+            <a:ext cx="1881809" cy="914400"/>
+          </a:xfrm>
+          <a:prstGeom prst="rect">
+            <a:avLst/>
+          </a:prstGeom>
+          <a:solidFill>
+            <a:srgbClr val="7030A0"/>
+          </a:solidFill>
+          <a:ln>
+            <a:solidFill>
+              <a:schemeClr val="tx1">
+                <a:lumMod val="50000"/>
+                <a:lumOff val="50000"/>
+              </a:schemeClr>
+            </a:solidFill>
+          </a:ln>
+        </p:spPr>
+        <p:style>
+          <a:lnRef idx="2">
+            <a:schemeClr val="accent1">
+              <a:shade val="50000"/>
+            </a:schemeClr>
+          </a:lnRef>
+          <a:fillRef idx="1">
+            <a:schemeClr val="accent1"/>
+          </a:fillRef>
+          <a:effectRef idx="0">
+            <a:schemeClr val="accent1"/>
+          </a:effectRef>
+          <a:fontRef idx="minor">
+            <a:schemeClr val="lt1"/>
+          </a:fontRef>
+        </p:style>
+        <p:txBody>
+          <a:bodyPr rtlCol="0" anchor="ctr"/>
+          <a:lstStyle/>
+          <a:p>
+            <a:pPr algn="ctr"/>
+            <a:endParaRPr lang="pt-BR" sz="1400" b="1" dirty="0">
+              <a:solidFill>
+                <a:schemeClr val="bg1"/>
+              </a:solidFill>
+            </a:endParaRPr>
+          </a:p>
+        </p:txBody>
+      </p:sp>
+      <p:sp>
+        <p:nvSpPr>
+          <p:cNvPr id="21" name="Retângulo 20">
+            <a:extLst>
+              <a:ext uri="{FF2B5EF4-FFF2-40B4-BE49-F238E27FC236}">
+                <a16:creationId xmlns:a16="http://schemas.microsoft.com/office/drawing/2014/main" id="{A26E5934-960F-429B-BDFF-3408B15947B0}"/>
+              </a:ext>
+            </a:extLst>
+          </p:cNvPr>
+          <p:cNvSpPr/>
+          <p:nvPr/>
+        </p:nvSpPr>
+        <p:spPr>
+          <a:xfrm>
+            <a:off x="5178402" y="3256380"/>
+            <a:ext cx="1881809" cy="914400"/>
+          </a:xfrm>
+          <a:prstGeom prst="rect">
+            <a:avLst/>
+          </a:prstGeom>
+          <a:solidFill>
+            <a:schemeClr val="accent6"/>
+          </a:solidFill>
+          <a:ln>
+            <a:solidFill>
+              <a:schemeClr val="tx1">
+                <a:lumMod val="50000"/>
+                <a:lumOff val="50000"/>
+              </a:schemeClr>
+            </a:solidFill>
+          </a:ln>
+        </p:spPr>
+        <p:style>
+          <a:lnRef idx="2">
+            <a:schemeClr val="accent1">
+              <a:shade val="50000"/>
+            </a:schemeClr>
+          </a:lnRef>
+          <a:fillRef idx="1">
+            <a:schemeClr val="accent1"/>
+          </a:fillRef>
+          <a:effectRef idx="0">
+            <a:schemeClr val="accent1"/>
+          </a:effectRef>
+          <a:fontRef idx="minor">
+            <a:schemeClr val="lt1"/>
+          </a:fontRef>
+        </p:style>
+        <p:txBody>
+          <a:bodyPr rtlCol="0" anchor="ctr"/>
+          <a:lstStyle/>
+          <a:p>
+            <a:pPr algn="ctr"/>
+            <a:endParaRPr lang="pt-BR" sz="1400" b="1" dirty="0">
+              <a:solidFill>
+                <a:schemeClr val="tx1"/>
+              </a:solidFill>
+            </a:endParaRPr>
+          </a:p>
+        </p:txBody>
+      </p:sp>
+      <p:sp>
+        <p:nvSpPr>
+          <p:cNvPr id="22" name="Retângulo 21">
+            <a:extLst>
+              <a:ext uri="{FF2B5EF4-FFF2-40B4-BE49-F238E27FC236}">
+                <a16:creationId xmlns:a16="http://schemas.microsoft.com/office/drawing/2014/main" id="{483416F0-C602-42AE-A2E3-AC992C995A76}"/>
+              </a:ext>
+            </a:extLst>
+          </p:cNvPr>
+          <p:cNvSpPr/>
+          <p:nvPr/>
+        </p:nvSpPr>
+        <p:spPr>
+          <a:xfrm>
+            <a:off x="7320849" y="3734161"/>
+            <a:ext cx="1881809" cy="914400"/>
+          </a:xfrm>
+          <a:prstGeom prst="rect">
+            <a:avLst/>
+          </a:prstGeom>
+          <a:solidFill>
+            <a:schemeClr val="accent6"/>
+          </a:solidFill>
+          <a:ln>
+            <a:solidFill>
+              <a:schemeClr val="tx1">
+                <a:lumMod val="50000"/>
+                <a:lumOff val="50000"/>
+              </a:schemeClr>
+            </a:solidFill>
+          </a:ln>
+        </p:spPr>
+        <p:style>
+          <a:lnRef idx="2">
+            <a:schemeClr val="accent1">
+              <a:shade val="50000"/>
+            </a:schemeClr>
+          </a:lnRef>
+          <a:fillRef idx="1">
+            <a:schemeClr val="accent1"/>
+          </a:fillRef>
+          <a:effectRef idx="0">
+            <a:schemeClr val="accent1"/>
+          </a:effectRef>
+          <a:fontRef idx="minor">
+            <a:schemeClr val="lt1"/>
+          </a:fontRef>
+        </p:style>
+        <p:txBody>
+          <a:bodyPr rtlCol="0" anchor="ctr"/>
+          <a:lstStyle/>
+          <a:p>
+            <a:pPr algn="ctr"/>
+            <a:endParaRPr lang="pt-BR" sz="1400" b="1" dirty="0">
+              <a:solidFill>
+                <a:schemeClr val="tx1"/>
+              </a:solidFill>
+            </a:endParaRPr>
+          </a:p>
+        </p:txBody>
+      </p:sp>
+      <p:sp>
+        <p:nvSpPr>
+          <p:cNvPr id="23" name="Retângulo 22">
+            <a:extLst>
+              <a:ext uri="{FF2B5EF4-FFF2-40B4-BE49-F238E27FC236}">
+                <a16:creationId xmlns:a16="http://schemas.microsoft.com/office/drawing/2014/main" id="{5E521320-2BDE-42C3-83E5-830F4ABB5301}"/>
+              </a:ext>
+            </a:extLst>
+          </p:cNvPr>
+          <p:cNvSpPr/>
+          <p:nvPr/>
+        </p:nvSpPr>
+        <p:spPr>
+          <a:xfrm>
+            <a:off x="2260477" y="1960889"/>
+            <a:ext cx="1881809" cy="914400"/>
+          </a:xfrm>
+          <a:prstGeom prst="rect">
+            <a:avLst/>
+          </a:prstGeom>
+          <a:solidFill>
+            <a:srgbClr val="FFFF00"/>
+          </a:solidFill>
+          <a:ln>
+            <a:solidFill>
+              <a:schemeClr val="tx1">
+                <a:lumMod val="50000"/>
+                <a:lumOff val="50000"/>
+              </a:schemeClr>
+            </a:solidFill>
+          </a:ln>
+        </p:spPr>
+        <p:style>
+          <a:lnRef idx="2">
+            <a:schemeClr val="accent1">
+              <a:shade val="50000"/>
+            </a:schemeClr>
+          </a:lnRef>
+          <a:fillRef idx="1">
+            <a:schemeClr val="accent1"/>
+          </a:fillRef>
+          <a:effectRef idx="0">
+            <a:schemeClr val="accent1"/>
+          </a:effectRef>
+          <a:fontRef idx="minor">
+            <a:schemeClr val="lt1"/>
+          </a:fontRef>
+        </p:style>
+        <p:txBody>
+          <a:bodyPr rtlCol="0" anchor="ctr"/>
+          <a:lstStyle/>
+          <a:p>
+            <a:pPr algn="ctr"/>
+            <a:endParaRPr lang="pt-BR" sz="1400" b="1" dirty="0">
+              <a:solidFill>
+                <a:schemeClr val="tx1"/>
+              </a:solidFill>
+            </a:endParaRPr>
+          </a:p>
+        </p:txBody>
+      </p:sp>
+      <p:sp>
+        <p:nvSpPr>
+          <p:cNvPr id="24" name="Retângulo 23">
+            <a:extLst>
+              <a:ext uri="{FF2B5EF4-FFF2-40B4-BE49-F238E27FC236}">
+                <a16:creationId xmlns:a16="http://schemas.microsoft.com/office/drawing/2014/main" id="{E706CF6F-FE10-4159-9879-42FA251FBAC9}"/>
+              </a:ext>
+            </a:extLst>
+          </p:cNvPr>
+          <p:cNvSpPr/>
+          <p:nvPr/>
+        </p:nvSpPr>
+        <p:spPr>
+          <a:xfrm>
+            <a:off x="189334" y="2326387"/>
+            <a:ext cx="1881809" cy="914400"/>
+          </a:xfrm>
+          <a:prstGeom prst="rect">
+            <a:avLst/>
+          </a:prstGeom>
+          <a:solidFill>
+            <a:srgbClr val="FFFF00"/>
+          </a:solidFill>
+          <a:ln>
+            <a:solidFill>
+              <a:schemeClr val="tx1">
+                <a:lumMod val="50000"/>
+                <a:lumOff val="50000"/>
+              </a:schemeClr>
+            </a:solidFill>
+          </a:ln>
+        </p:spPr>
+        <p:style>
+          <a:lnRef idx="2">
+            <a:schemeClr val="accent1">
+              <a:shade val="50000"/>
+            </a:schemeClr>
+          </a:lnRef>
+          <a:fillRef idx="1">
+            <a:schemeClr val="accent1"/>
+          </a:fillRef>
+          <a:effectRef idx="0">
+            <a:schemeClr val="accent1"/>
+          </a:effectRef>
+          <a:fontRef idx="minor">
+            <a:schemeClr val="lt1"/>
+          </a:fontRef>
+        </p:style>
+        <p:txBody>
+          <a:bodyPr rtlCol="0" anchor="ctr"/>
+          <a:lstStyle/>
+          <a:p>
+            <a:pPr algn="ctr"/>
+            <a:r>
+              <a:rPr lang="pt-BR" sz="1400" b="1" dirty="0">
+                <a:solidFill>
+                  <a:schemeClr val="tx1"/>
+                </a:solidFill>
+              </a:rPr>
+              <a:t>Escuta diversos estilos musicais </a:t>
+            </a:r>
+          </a:p>
+        </p:txBody>
+      </p:sp>
+      <p:cxnSp>
+        <p:nvCxnSpPr>
+          <p:cNvPr id="25" name="Conexão reta 24">
+            <a:extLst>
+              <a:ext uri="{FF2B5EF4-FFF2-40B4-BE49-F238E27FC236}">
+                <a16:creationId xmlns:a16="http://schemas.microsoft.com/office/drawing/2014/main" id="{933EE7A2-9084-4174-8C4D-BAFE671E86CE}"/>
+              </a:ext>
+            </a:extLst>
+          </p:cNvPr>
+          <p:cNvCxnSpPr>
+            <a:cxnSpLocks/>
+          </p:cNvCxnSpPr>
+          <p:nvPr/>
+        </p:nvCxnSpPr>
+        <p:spPr>
+          <a:xfrm flipH="1">
+            <a:off x="0" y="4833227"/>
+            <a:ext cx="12192000" cy="0"/>
+          </a:xfrm>
+          <a:prstGeom prst="line">
+            <a:avLst/>
+          </a:prstGeom>
+          <a:ln>
+            <a:solidFill>
+              <a:schemeClr val="tx1">
+                <a:lumMod val="85000"/>
+                <a:lumOff val="15000"/>
+              </a:schemeClr>
+            </a:solidFill>
+          </a:ln>
+        </p:spPr>
+        <p:style>
+          <a:lnRef idx="1">
+            <a:schemeClr val="accent1"/>
+          </a:lnRef>
+          <a:fillRef idx="0">
+            <a:schemeClr val="accent1"/>
+          </a:fillRef>
+          <a:effectRef idx="0">
+            <a:schemeClr val="accent1"/>
+          </a:effectRef>
+          <a:fontRef idx="minor">
+            <a:schemeClr val="tx1"/>
+          </a:fontRef>
+        </p:style>
+      </p:cxnSp>
+      <p:cxnSp>
+        <p:nvCxnSpPr>
+          <p:cNvPr id="26" name="Conexão reta 25">
+            <a:extLst>
+              <a:ext uri="{FF2B5EF4-FFF2-40B4-BE49-F238E27FC236}">
+                <a16:creationId xmlns:a16="http://schemas.microsoft.com/office/drawing/2014/main" id="{AC1C7B3A-BB11-4604-97E0-C4C7DB8FEAED}"/>
+              </a:ext>
+            </a:extLst>
+          </p:cNvPr>
+          <p:cNvCxnSpPr>
+            <a:cxnSpLocks/>
+            <a:endCxn id="11" idx="2"/>
+          </p:cNvCxnSpPr>
+          <p:nvPr/>
+        </p:nvCxnSpPr>
+        <p:spPr>
+          <a:xfrm flipV="1">
+            <a:off x="6095999" y="4833227"/>
+            <a:ext cx="1" cy="2024773"/>
+          </a:xfrm>
+          <a:prstGeom prst="line">
+            <a:avLst/>
+          </a:prstGeom>
+          <a:ln>
+            <a:solidFill>
+              <a:schemeClr val="tx1">
+                <a:lumMod val="85000"/>
+                <a:lumOff val="15000"/>
+              </a:schemeClr>
+            </a:solidFill>
+          </a:ln>
+        </p:spPr>
+        <p:style>
+          <a:lnRef idx="1">
+            <a:schemeClr val="accent1"/>
+          </a:lnRef>
+          <a:fillRef idx="0">
+            <a:schemeClr val="accent1"/>
+          </a:fillRef>
+          <a:effectRef idx="0">
+            <a:schemeClr val="accent1"/>
+          </a:effectRef>
+          <a:fontRef idx="minor">
+            <a:schemeClr val="tx1"/>
+          </a:fontRef>
+        </p:style>
+      </p:cxnSp>
+      <p:sp>
+        <p:nvSpPr>
+          <p:cNvPr id="29" name="Retângulo 28">
+            <a:extLst>
+              <a:ext uri="{FF2B5EF4-FFF2-40B4-BE49-F238E27FC236}">
+                <a16:creationId xmlns:a16="http://schemas.microsoft.com/office/drawing/2014/main" id="{BE36046E-1045-42DF-8C84-395432EE8EBE}"/>
+              </a:ext>
+            </a:extLst>
+          </p:cNvPr>
+          <p:cNvSpPr/>
+          <p:nvPr/>
+        </p:nvSpPr>
+        <p:spPr>
+          <a:xfrm>
+            <a:off x="-1" y="4839726"/>
+            <a:ext cx="1952586" cy="400110"/>
+          </a:xfrm>
+          <a:prstGeom prst="rect">
+            <a:avLst/>
+          </a:prstGeom>
+          <a:noFill/>
+        </p:spPr>
+        <p:txBody>
+          <a:bodyPr wrap="none" lIns="91440" tIns="45720" rIns="91440" bIns="45720">
+            <a:spAutoFit/>
+          </a:bodyPr>
+          <a:lstStyle/>
+          <a:p>
+            <a:pPr algn="ctr"/>
+            <a:r>
+              <a:rPr lang="pt-PT" sz="2000" b="0" cap="none" spc="0" dirty="0">
+                <a:ln w="0"/>
+                <a:solidFill>
+                  <a:srgbClr val="C00000"/>
+                </a:solidFill>
+                <a:effectLst>
+                  <a:outerShdw blurRad="38100" dist="19050" dir="2700000" algn="tl" rotWithShape="0">
+                    <a:schemeClr val="dk1">
+                      <a:alpha val="40000"/>
+                    </a:schemeClr>
+                  </a:outerShdw>
+                </a:effectLst>
+                <a:latin typeface="Segoe UI "/>
+                <a:ea typeface="Segoe UI Black" panose="020B0A02040204020203" pitchFamily="34" charset="0"/>
+                <a:cs typeface="Segoe UI Light" panose="020B0502040204020203" pitchFamily="34" charset="0"/>
+              </a:rPr>
+              <a:t>Quais as dores?</a:t>
+            </a:r>
+          </a:p>
+        </p:txBody>
+      </p:sp>
+      <p:sp>
+        <p:nvSpPr>
+          <p:cNvPr id="30" name="Retângulo 29">
+            <a:extLst>
+              <a:ext uri="{FF2B5EF4-FFF2-40B4-BE49-F238E27FC236}">
+                <a16:creationId xmlns:a16="http://schemas.microsoft.com/office/drawing/2014/main" id="{0F364C30-48E7-4454-B52E-E13FFE735D64}"/>
+              </a:ext>
+            </a:extLst>
+          </p:cNvPr>
+          <p:cNvSpPr/>
+          <p:nvPr/>
+        </p:nvSpPr>
+        <p:spPr>
+          <a:xfrm>
+            <a:off x="6095999" y="4842362"/>
+            <a:ext cx="2810385" cy="400110"/>
+          </a:xfrm>
+          <a:prstGeom prst="rect">
+            <a:avLst/>
+          </a:prstGeom>
+          <a:noFill/>
+        </p:spPr>
+        <p:txBody>
+          <a:bodyPr wrap="none" lIns="91440" tIns="45720" rIns="91440" bIns="45720">
+            <a:spAutoFit/>
+          </a:bodyPr>
+          <a:lstStyle/>
+          <a:p>
+            <a:pPr algn="ctr"/>
+            <a:r>
+              <a:rPr lang="pt-PT" sz="2000" b="0" cap="none" spc="0" dirty="0">
+                <a:ln w="0"/>
+                <a:solidFill>
+                  <a:srgbClr val="C00000"/>
+                </a:solidFill>
+                <a:effectLst>
+                  <a:outerShdw blurRad="38100" dist="19050" dir="2700000" algn="tl" rotWithShape="0">
+                    <a:schemeClr val="dk1">
+                      <a:alpha val="40000"/>
+                    </a:schemeClr>
+                  </a:outerShdw>
+                </a:effectLst>
+                <a:latin typeface="Segoe UI "/>
+                <a:ea typeface="Segoe UI Black" panose="020B0A02040204020203" pitchFamily="34" charset="0"/>
+                <a:cs typeface="Segoe UI Light" panose="020B0502040204020203" pitchFamily="34" charset="0"/>
+              </a:rPr>
+              <a:t>Quais as necessidades?</a:t>
+            </a:r>
+          </a:p>
+        </p:txBody>
+      </p:sp>
+      <p:sp>
+        <p:nvSpPr>
+          <p:cNvPr id="33" name="Retângulo 32">
+            <a:extLst>
+              <a:ext uri="{FF2B5EF4-FFF2-40B4-BE49-F238E27FC236}">
+                <a16:creationId xmlns:a16="http://schemas.microsoft.com/office/drawing/2014/main" id="{B75D41B6-A21E-4C36-9C2E-E5F26D10D303}"/>
+              </a:ext>
+            </a:extLst>
+          </p:cNvPr>
+          <p:cNvSpPr/>
+          <p:nvPr/>
+        </p:nvSpPr>
+        <p:spPr>
+          <a:xfrm>
+            <a:off x="2260477" y="5147901"/>
+            <a:ext cx="1528029" cy="742493"/>
+          </a:xfrm>
+          <a:prstGeom prst="rect">
+            <a:avLst/>
+          </a:prstGeom>
+          <a:solidFill>
+            <a:srgbClr val="FFC000"/>
+          </a:solidFill>
+          <a:ln>
+            <a:solidFill>
+              <a:schemeClr val="tx1">
+                <a:lumMod val="50000"/>
+                <a:lumOff val="50000"/>
+              </a:schemeClr>
+            </a:solidFill>
+          </a:ln>
+        </p:spPr>
+        <p:style>
+          <a:lnRef idx="2">
+            <a:schemeClr val="accent1">
+              <a:shade val="50000"/>
+            </a:schemeClr>
+          </a:lnRef>
+          <a:fillRef idx="1">
+            <a:schemeClr val="accent1"/>
+          </a:fillRef>
+          <a:effectRef idx="0">
+            <a:schemeClr val="accent1"/>
+          </a:effectRef>
+          <a:fontRef idx="minor">
+            <a:schemeClr val="lt1"/>
+          </a:fontRef>
+        </p:style>
+        <p:txBody>
+          <a:bodyPr rtlCol="0" anchor="ctr"/>
+          <a:lstStyle/>
+          <a:p>
+            <a:pPr algn="ctr"/>
+            <a:r>
+              <a:rPr lang="pt-BR" sz="1200" b="1" dirty="0">
+                <a:solidFill>
+                  <a:schemeClr val="tx1"/>
+                </a:solidFill>
+              </a:rPr>
+              <a:t>Sempre cai na monotonia de estar em contato com as mesmas coisas</a:t>
+            </a:r>
+          </a:p>
+        </p:txBody>
+      </p:sp>
+      <p:sp>
+        <p:nvSpPr>
+          <p:cNvPr id="34" name="Retângulo 33">
+            <a:extLst>
+              <a:ext uri="{FF2B5EF4-FFF2-40B4-BE49-F238E27FC236}">
+                <a16:creationId xmlns:a16="http://schemas.microsoft.com/office/drawing/2014/main" id="{273472F0-4B10-4702-AF0D-BEE157DDBC03}"/>
+              </a:ext>
+            </a:extLst>
+          </p:cNvPr>
+          <p:cNvSpPr/>
+          <p:nvPr/>
+        </p:nvSpPr>
+        <p:spPr>
+          <a:xfrm>
+            <a:off x="331030" y="5742628"/>
+            <a:ext cx="1528029" cy="742493"/>
+          </a:xfrm>
+          <a:prstGeom prst="rect">
+            <a:avLst/>
+          </a:prstGeom>
+          <a:solidFill>
+            <a:srgbClr val="FFC000"/>
+          </a:solidFill>
+          <a:ln>
+            <a:solidFill>
+              <a:schemeClr val="tx1">
+                <a:lumMod val="50000"/>
+                <a:lumOff val="50000"/>
+              </a:schemeClr>
+            </a:solidFill>
+          </a:ln>
+        </p:spPr>
+        <p:style>
+          <a:lnRef idx="2">
+            <a:schemeClr val="accent1">
+              <a:shade val="50000"/>
+            </a:schemeClr>
+          </a:lnRef>
+          <a:fillRef idx="1">
+            <a:schemeClr val="accent1"/>
+          </a:fillRef>
+          <a:effectRef idx="0">
+            <a:schemeClr val="accent1"/>
+          </a:effectRef>
+          <a:fontRef idx="minor">
+            <a:schemeClr val="lt1"/>
+          </a:fontRef>
+        </p:style>
+        <p:txBody>
+          <a:bodyPr rtlCol="0" anchor="ctr"/>
+          <a:lstStyle/>
+          <a:p>
+            <a:pPr algn="ctr"/>
+            <a:r>
+              <a:rPr lang="pt-BR" sz="1200" b="1" dirty="0">
+                <a:solidFill>
+                  <a:schemeClr val="tx1"/>
+                </a:solidFill>
+              </a:rPr>
+              <a:t>Não acha conteúdo tão facilmente para consumir</a:t>
+            </a:r>
+          </a:p>
+        </p:txBody>
+      </p:sp>
+      <p:sp>
+        <p:nvSpPr>
+          <p:cNvPr id="35" name="Retângulo 34">
+            <a:extLst>
+              <a:ext uri="{FF2B5EF4-FFF2-40B4-BE49-F238E27FC236}">
+                <a16:creationId xmlns:a16="http://schemas.microsoft.com/office/drawing/2014/main" id="{685E9C2D-A396-4A08-A150-5E5E131F2D2A}"/>
+              </a:ext>
+            </a:extLst>
+          </p:cNvPr>
+          <p:cNvSpPr/>
+          <p:nvPr/>
+        </p:nvSpPr>
+        <p:spPr>
+          <a:xfrm>
+            <a:off x="4011468" y="5943643"/>
+            <a:ext cx="1528029" cy="742493"/>
+          </a:xfrm>
+          <a:prstGeom prst="rect">
+            <a:avLst/>
+          </a:prstGeom>
+          <a:solidFill>
+            <a:srgbClr val="FFC000"/>
+          </a:solidFill>
+          <a:ln>
+            <a:solidFill>
+              <a:schemeClr val="tx1">
+                <a:lumMod val="50000"/>
+                <a:lumOff val="50000"/>
+              </a:schemeClr>
+            </a:solidFill>
+          </a:ln>
+        </p:spPr>
+        <p:style>
+          <a:lnRef idx="2">
+            <a:schemeClr val="accent1">
+              <a:shade val="50000"/>
+            </a:schemeClr>
+          </a:lnRef>
+          <a:fillRef idx="1">
+            <a:schemeClr val="accent1"/>
+          </a:fillRef>
+          <a:effectRef idx="0">
+            <a:schemeClr val="accent1"/>
+          </a:effectRef>
+          <a:fontRef idx="minor">
+            <a:schemeClr val="lt1"/>
+          </a:fontRef>
+        </p:style>
+        <p:txBody>
+          <a:bodyPr rtlCol="0" anchor="ctr"/>
+          <a:lstStyle/>
+          <a:p>
+            <a:pPr algn="ctr"/>
+            <a:r>
+              <a:rPr lang="pt-BR" sz="1200" b="1" dirty="0">
+                <a:solidFill>
+                  <a:schemeClr val="tx1"/>
+                </a:solidFill>
+              </a:rPr>
+              <a:t>As plataformas recomendam o que querem que ela veja, não o que quer ver</a:t>
+            </a:r>
+          </a:p>
+        </p:txBody>
+      </p:sp>
+      <p:sp>
+        <p:nvSpPr>
+          <p:cNvPr id="36" name="Retângulo 35">
+            <a:extLst>
+              <a:ext uri="{FF2B5EF4-FFF2-40B4-BE49-F238E27FC236}">
+                <a16:creationId xmlns:a16="http://schemas.microsoft.com/office/drawing/2014/main" id="{9C4507C2-CE17-4F89-8EEE-442D23F9B3F4}"/>
+              </a:ext>
+            </a:extLst>
+          </p:cNvPr>
+          <p:cNvSpPr/>
+          <p:nvPr/>
+        </p:nvSpPr>
+        <p:spPr>
+          <a:xfrm>
+            <a:off x="8248409" y="5475843"/>
+            <a:ext cx="1528029" cy="742493"/>
+          </a:xfrm>
+          <a:prstGeom prst="rect">
+            <a:avLst/>
+          </a:prstGeom>
+          <a:solidFill>
+            <a:srgbClr val="FC7774"/>
+          </a:solidFill>
+          <a:ln>
+            <a:solidFill>
+              <a:schemeClr val="tx1">
+                <a:lumMod val="50000"/>
+                <a:lumOff val="50000"/>
+              </a:schemeClr>
+            </a:solidFill>
+          </a:ln>
+        </p:spPr>
+        <p:style>
+          <a:lnRef idx="2">
+            <a:schemeClr val="accent1">
+              <a:shade val="50000"/>
+            </a:schemeClr>
+          </a:lnRef>
+          <a:fillRef idx="1">
+            <a:schemeClr val="accent1"/>
+          </a:fillRef>
+          <a:effectRef idx="0">
+            <a:schemeClr val="accent1"/>
+          </a:effectRef>
+          <a:fontRef idx="minor">
+            <a:schemeClr val="lt1"/>
+          </a:fontRef>
+        </p:style>
+        <p:txBody>
+          <a:bodyPr rtlCol="0" anchor="ctr"/>
+          <a:lstStyle/>
+          <a:p>
+            <a:pPr algn="ctr"/>
+            <a:r>
+              <a:rPr lang="pt-BR" sz="1200" b="1" dirty="0">
+                <a:solidFill>
+                  <a:schemeClr val="tx1"/>
+                </a:solidFill>
+              </a:rPr>
+              <a:t>Se sente bem quando se depara com a Arte</a:t>
+            </a:r>
+          </a:p>
+        </p:txBody>
+      </p:sp>
+      <p:sp>
+        <p:nvSpPr>
+          <p:cNvPr id="37" name="Retângulo 36">
+            <a:extLst>
+              <a:ext uri="{FF2B5EF4-FFF2-40B4-BE49-F238E27FC236}">
+                <a16:creationId xmlns:a16="http://schemas.microsoft.com/office/drawing/2014/main" id="{4DD1A9A6-DE5D-4226-AA85-D920BC7FD78F}"/>
+              </a:ext>
+            </a:extLst>
+          </p:cNvPr>
+          <p:cNvSpPr/>
+          <p:nvPr/>
+        </p:nvSpPr>
+        <p:spPr>
+          <a:xfrm>
+            <a:off x="10025761" y="4927630"/>
+            <a:ext cx="1528029" cy="742493"/>
+          </a:xfrm>
+          <a:prstGeom prst="rect">
+            <a:avLst/>
+          </a:prstGeom>
+          <a:solidFill>
+            <a:srgbClr val="FC7774"/>
+          </a:solidFill>
+          <a:ln>
+            <a:solidFill>
+              <a:schemeClr val="tx1">
+                <a:lumMod val="50000"/>
+                <a:lumOff val="50000"/>
+              </a:schemeClr>
+            </a:solidFill>
+          </a:ln>
+        </p:spPr>
+        <p:style>
+          <a:lnRef idx="2">
+            <a:schemeClr val="accent1">
+              <a:shade val="50000"/>
+            </a:schemeClr>
+          </a:lnRef>
+          <a:fillRef idx="1">
+            <a:schemeClr val="accent1"/>
+          </a:fillRef>
+          <a:effectRef idx="0">
+            <a:schemeClr val="accent1"/>
+          </a:effectRef>
+          <a:fontRef idx="minor">
+            <a:schemeClr val="lt1"/>
+          </a:fontRef>
+        </p:style>
+        <p:txBody>
+          <a:bodyPr rtlCol="0" anchor="ctr"/>
+          <a:lstStyle/>
+          <a:p>
+            <a:pPr algn="ctr"/>
+            <a:r>
+              <a:rPr lang="pt-BR" sz="1200" b="1" dirty="0">
+                <a:solidFill>
+                  <a:schemeClr val="tx1"/>
+                </a:solidFill>
+              </a:rPr>
+              <a:t>Estar mais próximo dos artistas que fazem seu estilo</a:t>
+            </a:r>
+          </a:p>
+        </p:txBody>
+      </p:sp>
+      <p:sp>
+        <p:nvSpPr>
+          <p:cNvPr id="38" name="Retângulo 37">
+            <a:extLst>
+              <a:ext uri="{FF2B5EF4-FFF2-40B4-BE49-F238E27FC236}">
+                <a16:creationId xmlns:a16="http://schemas.microsoft.com/office/drawing/2014/main" id="{60BC752E-24C6-410A-8945-0910A1988F8C}"/>
+              </a:ext>
+            </a:extLst>
+          </p:cNvPr>
+          <p:cNvSpPr/>
+          <p:nvPr/>
+        </p:nvSpPr>
+        <p:spPr>
+          <a:xfrm>
+            <a:off x="10025762" y="5943641"/>
+            <a:ext cx="1528029" cy="742493"/>
+          </a:xfrm>
+          <a:prstGeom prst="rect">
+            <a:avLst/>
+          </a:prstGeom>
+          <a:solidFill>
+            <a:srgbClr val="FC7774"/>
+          </a:solidFill>
+          <a:ln>
+            <a:solidFill>
+              <a:schemeClr val="tx1">
+                <a:lumMod val="50000"/>
+                <a:lumOff val="50000"/>
+              </a:schemeClr>
+            </a:solidFill>
+          </a:ln>
+        </p:spPr>
+        <p:style>
+          <a:lnRef idx="2">
+            <a:schemeClr val="accent1">
+              <a:shade val="50000"/>
+            </a:schemeClr>
+          </a:lnRef>
+          <a:fillRef idx="1">
+            <a:schemeClr val="accent1"/>
+          </a:fillRef>
+          <a:effectRef idx="0">
+            <a:schemeClr val="accent1"/>
+          </a:effectRef>
+          <a:fontRef idx="minor">
+            <a:schemeClr val="lt1"/>
+          </a:fontRef>
+        </p:style>
+        <p:txBody>
+          <a:bodyPr rtlCol="0" anchor="ctr"/>
+          <a:lstStyle/>
+          <a:p>
+            <a:pPr algn="ctr"/>
+            <a:r>
+              <a:rPr lang="pt-BR" sz="1200" b="1" dirty="0">
+                <a:solidFill>
+                  <a:schemeClr val="tx1"/>
+                </a:solidFill>
+              </a:rPr>
+              <a:t>Quer encontrar algo com o que se identifique</a:t>
+            </a:r>
+          </a:p>
+        </p:txBody>
+      </p:sp>
+      <p:sp>
+        <p:nvSpPr>
+          <p:cNvPr id="39" name="Retângulo 38">
+            <a:extLst>
+              <a:ext uri="{FF2B5EF4-FFF2-40B4-BE49-F238E27FC236}">
+                <a16:creationId xmlns:a16="http://schemas.microsoft.com/office/drawing/2014/main" id="{AEBF6859-37EB-43B7-ACC3-C81D8151E99D}"/>
+              </a:ext>
+            </a:extLst>
+          </p:cNvPr>
+          <p:cNvSpPr/>
+          <p:nvPr/>
+        </p:nvSpPr>
+        <p:spPr>
+          <a:xfrm>
+            <a:off x="6408190" y="5754665"/>
+            <a:ext cx="1528029" cy="742493"/>
+          </a:xfrm>
+          <a:prstGeom prst="rect">
+            <a:avLst/>
+          </a:prstGeom>
+          <a:solidFill>
+            <a:srgbClr val="FC7774"/>
+          </a:solidFill>
+          <a:ln>
+            <a:solidFill>
+              <a:schemeClr val="tx1">
+                <a:lumMod val="50000"/>
+                <a:lumOff val="50000"/>
+              </a:schemeClr>
+            </a:solidFill>
+          </a:ln>
+        </p:spPr>
+        <p:style>
+          <a:lnRef idx="2">
+            <a:schemeClr val="accent1">
+              <a:shade val="50000"/>
+            </a:schemeClr>
+          </a:lnRef>
+          <a:fillRef idx="1">
+            <a:schemeClr val="accent1"/>
+          </a:fillRef>
+          <a:effectRef idx="0">
+            <a:schemeClr val="accent1"/>
+          </a:effectRef>
+          <a:fontRef idx="minor">
+            <a:schemeClr val="lt1"/>
+          </a:fontRef>
+        </p:style>
+        <p:txBody>
+          <a:bodyPr rtlCol="0" anchor="ctr"/>
+          <a:lstStyle/>
+          <a:p>
+            <a:pPr algn="ctr"/>
+            <a:r>
+              <a:rPr lang="pt-BR" sz="1200" b="1" dirty="0">
+                <a:solidFill>
+                  <a:schemeClr val="tx1"/>
+                </a:solidFill>
+              </a:rPr>
+              <a:t>Precisa de um conteúdo consistente e de qualidade</a:t>
+            </a:r>
+          </a:p>
+        </p:txBody>
+      </p:sp>
+      <p:sp>
+        <p:nvSpPr>
+          <p:cNvPr id="40" name="Oval 39">
+            <a:extLst>
+              <a:ext uri="{FF2B5EF4-FFF2-40B4-BE49-F238E27FC236}">
+                <a16:creationId xmlns:a16="http://schemas.microsoft.com/office/drawing/2014/main" id="{20CE1BB0-19F4-4E0A-AF0B-345D54012290}"/>
+              </a:ext>
+            </a:extLst>
+          </p:cNvPr>
+          <p:cNvSpPr/>
+          <p:nvPr/>
+        </p:nvSpPr>
+        <p:spPr>
+          <a:xfrm>
+            <a:off x="5351975" y="1704307"/>
+            <a:ext cx="1298714" cy="1298714"/>
+          </a:xfrm>
+          <a:prstGeom prst="ellipse">
+            <a:avLst/>
+          </a:prstGeom>
+        </p:spPr>
+        <p:style>
+          <a:lnRef idx="2">
+            <a:schemeClr val="dk1"/>
+          </a:lnRef>
+          <a:fillRef idx="1">
+            <a:schemeClr val="lt1"/>
+          </a:fillRef>
+          <a:effectRef idx="0">
+            <a:schemeClr val="dk1"/>
+          </a:effectRef>
+          <a:fontRef idx="minor">
+            <a:schemeClr val="dk1"/>
+          </a:fontRef>
+        </p:style>
+        <p:txBody>
+          <a:bodyPr rtlCol="0" anchor="ctr"/>
+          <a:lstStyle/>
+          <a:p>
+            <a:pPr algn="ctr"/>
+            <a:r>
+              <a:rPr lang="pt-BR" dirty="0"/>
+              <a:t>Público</a:t>
+            </a:r>
+          </a:p>
+        </p:txBody>
+      </p:sp>
+    </p:spTree>
+    <p:extLst>
+      <p:ext uri="{BB962C8B-B14F-4D97-AF65-F5344CB8AC3E}">
+        <p14:creationId xmlns:p14="http://schemas.microsoft.com/office/powerpoint/2010/main" val="1206746797"/>
+      </p:ext>
+    </p:extLst>
+  </p:cSld>
+  <p:clrMapOvr>
+    <a:masterClrMapping/>
+  </p:clrMapOvr>
+</p:sld>
+</file>
+
+<file path=ppt/slides/slide3.xml><?xml version="1.0" encoding="utf-8"?>
+<p:sld xmlns:a="http://schemas.openxmlformats.org/drawingml/2006/main" xmlns:r="http://schemas.openxmlformats.org/officeDocument/2006/relationships" xmlns:p="http://schemas.openxmlformats.org/presentationml/2006/main">
+  <p:cSld>
+    <p:spTree>
+      <p:nvGrpSpPr>
+        <p:cNvPr id="1" name=""/>
+        <p:cNvGrpSpPr/>
+        <p:nvPr/>
+      </p:nvGrpSpPr>
+      <p:grpSpPr>
+        <a:xfrm>
+          <a:off x="0" y="0"/>
+          <a:ext cx="0" cy="0"/>
+          <a:chOff x="0" y="0"/>
+          <a:chExt cx="0" cy="0"/>
+        </a:xfrm>
+      </p:grpSpPr>
+      <p:cxnSp>
+        <p:nvCxnSpPr>
           <p:cNvPr id="4" name="Conexão reta 3">
             <a:extLst>
               <a:ext uri="{FF2B5EF4-FFF2-40B4-BE49-F238E27FC236}">
@@ -4549,8 +7093,8 @@
         </p:nvSpPr>
         <p:spPr>
           <a:xfrm>
-            <a:off x="439918" y="1326081"/>
-            <a:ext cx="1881809" cy="914400"/>
+            <a:off x="439918" y="1497987"/>
+            <a:ext cx="1528029" cy="742493"/>
           </a:xfrm>
           <a:prstGeom prst="rect">
             <a:avLst/>
@@ -4589,7 +7133,7 @@
           <a:p>
             <a:pPr algn="ctr"/>
             <a:r>
-              <a:rPr lang="pt-BR" sz="1400" b="1" dirty="0">
+              <a:rPr lang="pt-BR" sz="1200" b="1" dirty="0">
                 <a:solidFill>
                   <a:schemeClr val="tx1"/>
                 </a:solidFill>
@@ -4613,8 +7157,8 @@
         </p:nvSpPr>
         <p:spPr>
           <a:xfrm>
-            <a:off x="7549708" y="1186933"/>
-            <a:ext cx="1881809" cy="914400"/>
+            <a:off x="7549708" y="1358839"/>
+            <a:ext cx="1528029" cy="742493"/>
           </a:xfrm>
           <a:prstGeom prst="rect">
             <a:avLst/>
@@ -4653,7 +7197,7 @@
           <a:p>
             <a:pPr algn="ctr"/>
             <a:r>
-              <a:rPr lang="pt-BR" sz="1400" b="1" dirty="0">
+              <a:rPr lang="pt-BR" sz="1200" b="1" dirty="0">
                 <a:solidFill>
                   <a:schemeClr val="tx1"/>
                 </a:solidFill>
@@ -4677,8 +7221,8 @@
         </p:nvSpPr>
         <p:spPr>
           <a:xfrm>
-            <a:off x="9870273" y="2240481"/>
-            <a:ext cx="1881809" cy="914400"/>
+            <a:off x="9870273" y="2412387"/>
+            <a:ext cx="1528029" cy="742493"/>
           </a:xfrm>
           <a:prstGeom prst="rect">
             <a:avLst/>
@@ -4717,26 +7261,13 @@
           <a:p>
             <a:pPr algn="ctr"/>
             <a:r>
-              <a:rPr lang="pt-BR" sz="1400" b="1" dirty="0">
+              <a:rPr lang="pt-BR" sz="1200" b="1" dirty="0">
                 <a:solidFill>
                   <a:schemeClr val="tx1"/>
                 </a:solidFill>
               </a:rPr>
-              <a:t>Ter um público </a:t>
-            </a:r>
-            <a:r>
-              <a:rPr lang="pt-BR" sz="1400" b="1" dirty="0" err="1">
-                <a:solidFill>
-                  <a:schemeClr val="tx1"/>
-                </a:solidFill>
-              </a:rPr>
-              <a:t>relevant</a:t>
-            </a:r>
-            <a:endParaRPr lang="pt-BR" sz="1400" b="1" dirty="0">
-              <a:solidFill>
-                <a:schemeClr val="tx1"/>
-              </a:solidFill>
-            </a:endParaRPr>
+              <a:t>Ter um público relevante (quantidade)</a:t>
+            </a:r>
           </a:p>
         </p:txBody>
       </p:sp>
@@ -4754,8 +7285,8 @@
         </p:nvSpPr>
         <p:spPr>
           <a:xfrm>
-            <a:off x="7093943" y="2697681"/>
-            <a:ext cx="1881809" cy="914400"/>
+            <a:off x="7093943" y="2869587"/>
+            <a:ext cx="1528029" cy="742493"/>
           </a:xfrm>
           <a:prstGeom prst="rect">
             <a:avLst/>
@@ -4793,11 +7324,14 @@
           <a:lstStyle/>
           <a:p>
             <a:pPr algn="ctr"/>
-            <a:endParaRPr lang="pt-BR" sz="1400" b="1" dirty="0">
-              <a:solidFill>
-                <a:schemeClr val="tx1"/>
-              </a:solidFill>
-            </a:endParaRPr>
+            <a:r>
+              <a:rPr lang="pt-BR" sz="1200" b="1" dirty="0">
+                <a:solidFill>
+                  <a:schemeClr val="tx1"/>
+                </a:solidFill>
+              </a:rPr>
+              <a:t>Pessoas que consomem suas produções</a:t>
+            </a:r>
           </a:p>
         </p:txBody>
       </p:sp>
@@ -4815,8 +7349,8 @@
         </p:nvSpPr>
         <p:spPr>
           <a:xfrm>
-            <a:off x="9458738" y="3773076"/>
-            <a:ext cx="1881809" cy="914400"/>
+            <a:off x="9458738" y="3944982"/>
+            <a:ext cx="1528029" cy="742493"/>
           </a:xfrm>
           <a:prstGeom prst="rect">
             <a:avLst/>
@@ -4854,20 +7388,23 @@
           <a:lstStyle/>
           <a:p>
             <a:pPr algn="ctr"/>
-            <a:endParaRPr lang="pt-BR" sz="1400" b="1" dirty="0">
-              <a:solidFill>
-                <a:schemeClr val="tx1"/>
-              </a:solidFill>
-            </a:endParaRPr>
-          </a:p>
-        </p:txBody>
-      </p:sp>
-      <p:sp>
-        <p:nvSpPr>
-          <p:cNvPr id="14" name="Retângulo 13">
-            <a:extLst>
-              <a:ext uri="{FF2B5EF4-FFF2-40B4-BE49-F238E27FC236}">
-                <a16:creationId xmlns:a16="http://schemas.microsoft.com/office/drawing/2014/main" id="{AD8C5FDA-2B40-49D4-A20E-69D98DF37B4A}"/>
+            <a:r>
+              <a:rPr lang="pt-BR" sz="1200" b="1" dirty="0">
+                <a:solidFill>
+                  <a:schemeClr val="tx1"/>
+                </a:solidFill>
+              </a:rPr>
+              <a:t>Precisa de um meio de comunicação com seu público</a:t>
+            </a:r>
+          </a:p>
+        </p:txBody>
+      </p:sp>
+      <p:sp>
+        <p:nvSpPr>
+          <p:cNvPr id="15" name="Retângulo 14">
+            <a:extLst>
+              <a:ext uri="{FF2B5EF4-FFF2-40B4-BE49-F238E27FC236}">
+                <a16:creationId xmlns:a16="http://schemas.microsoft.com/office/drawing/2014/main" id="{0CC32A85-9C84-4A6E-B436-2145D21CE926}"/>
               </a:ext>
             </a:extLst>
           </p:cNvPr>
@@ -4876,69 +7413,8 @@
         </p:nvSpPr>
         <p:spPr>
           <a:xfrm>
-            <a:off x="6929037" y="5012155"/>
-            <a:ext cx="1881809" cy="914400"/>
-          </a:xfrm>
-          <a:prstGeom prst="rect">
-            <a:avLst/>
-          </a:prstGeom>
-          <a:solidFill>
-            <a:srgbClr val="23AFF5"/>
-          </a:solidFill>
-          <a:ln>
-            <a:solidFill>
-              <a:schemeClr val="tx1">
-                <a:lumMod val="50000"/>
-                <a:lumOff val="50000"/>
-              </a:schemeClr>
-            </a:solidFill>
-          </a:ln>
-        </p:spPr>
-        <p:style>
-          <a:lnRef idx="2">
-            <a:schemeClr val="accent1">
-              <a:shade val="50000"/>
-            </a:schemeClr>
-          </a:lnRef>
-          <a:fillRef idx="1">
-            <a:schemeClr val="accent1"/>
-          </a:fillRef>
-          <a:effectRef idx="0">
-            <a:schemeClr val="accent1"/>
-          </a:effectRef>
-          <a:fontRef idx="minor">
-            <a:schemeClr val="lt1"/>
-          </a:fontRef>
-        </p:style>
-        <p:txBody>
-          <a:bodyPr rtlCol="0" anchor="ctr"/>
-          <a:lstStyle/>
-          <a:p>
-            <a:pPr algn="ctr"/>
-            <a:endParaRPr lang="pt-BR" sz="1400" b="1" dirty="0">
-              <a:solidFill>
-                <a:schemeClr val="tx1"/>
-              </a:solidFill>
-            </a:endParaRPr>
-          </a:p>
-        </p:txBody>
-      </p:sp>
-      <p:sp>
-        <p:nvSpPr>
-          <p:cNvPr id="15" name="Retângulo 14">
-            <a:extLst>
-              <a:ext uri="{FF2B5EF4-FFF2-40B4-BE49-F238E27FC236}">
-                <a16:creationId xmlns:a16="http://schemas.microsoft.com/office/drawing/2014/main" id="{0CC32A85-9C84-4A6E-B436-2145D21CE926}"/>
-              </a:ext>
-            </a:extLst>
-          </p:cNvPr>
-          <p:cNvSpPr/>
-          <p:nvPr/>
-        </p:nvSpPr>
-        <p:spPr>
-          <a:xfrm>
-            <a:off x="3375275" y="1644133"/>
-            <a:ext cx="1881809" cy="914400"/>
+            <a:off x="3375275" y="1816039"/>
+            <a:ext cx="1528029" cy="742493"/>
           </a:xfrm>
           <a:prstGeom prst="rect">
             <a:avLst/>
@@ -4976,11 +7452,14 @@
           <a:lstStyle/>
           <a:p>
             <a:pPr algn="ctr"/>
-            <a:endParaRPr lang="pt-BR" sz="1400" b="1" dirty="0">
-              <a:solidFill>
-                <a:schemeClr val="tx1"/>
-              </a:solidFill>
-            </a:endParaRPr>
+            <a:r>
+              <a:rPr lang="pt-BR" sz="1200" b="1" dirty="0">
+                <a:solidFill>
+                  <a:schemeClr val="tx1"/>
+                </a:solidFill>
+              </a:rPr>
+              <a:t>Não tem espaço no mercado</a:t>
+            </a:r>
           </a:p>
         </p:txBody>
       </p:sp>
@@ -4998,8 +7477,8 @@
         </p:nvSpPr>
         <p:spPr>
           <a:xfrm>
-            <a:off x="585693" y="2879418"/>
-            <a:ext cx="1881809" cy="914400"/>
+            <a:off x="585693" y="3051324"/>
+            <a:ext cx="1528029" cy="742493"/>
           </a:xfrm>
           <a:prstGeom prst="rect">
             <a:avLst/>
@@ -5037,11 +7516,14 @@
           <a:lstStyle/>
           <a:p>
             <a:pPr algn="ctr"/>
-            <a:endParaRPr lang="pt-BR" sz="1400" b="1" dirty="0">
-              <a:solidFill>
-                <a:schemeClr val="tx1"/>
-              </a:solidFill>
-            </a:endParaRPr>
+            <a:r>
+              <a:rPr lang="pt-BR" sz="1200" b="1" dirty="0">
+                <a:solidFill>
+                  <a:schemeClr val="tx1"/>
+                </a:solidFill>
+              </a:rPr>
+              <a:t>Sente que seu trabalho não é valorizado</a:t>
+            </a:r>
           </a:p>
         </p:txBody>
       </p:sp>
@@ -5059,8 +7541,8 @@
         </p:nvSpPr>
         <p:spPr>
           <a:xfrm>
-            <a:off x="3375274" y="3612081"/>
-            <a:ext cx="1881809" cy="914400"/>
+            <a:off x="3375274" y="3783987"/>
+            <a:ext cx="1528029" cy="742493"/>
           </a:xfrm>
           <a:prstGeom prst="rect">
             <a:avLst/>
@@ -5098,11 +7580,14 @@
           <a:lstStyle/>
           <a:p>
             <a:pPr algn="ctr"/>
-            <a:endParaRPr lang="pt-BR" sz="1400" b="1" dirty="0">
-              <a:solidFill>
-                <a:schemeClr val="tx1"/>
-              </a:solidFill>
-            </a:endParaRPr>
+            <a:r>
+              <a:rPr lang="pt-BR" sz="1200" b="1" dirty="0">
+                <a:solidFill>
+                  <a:schemeClr val="tx1"/>
+                </a:solidFill>
+              </a:rPr>
+              <a:t>O mercado da arte é muito fechado/ elitizado</a:t>
+            </a:r>
           </a:p>
         </p:txBody>
       </p:sp>
@@ -5120,8 +7605,8 @@
         </p:nvSpPr>
         <p:spPr>
           <a:xfrm>
-            <a:off x="1380822" y="5074719"/>
-            <a:ext cx="1881809" cy="914400"/>
+            <a:off x="1380822" y="5246625"/>
+            <a:ext cx="1528029" cy="742493"/>
           </a:xfrm>
           <a:prstGeom prst="rect">
             <a:avLst/>
@@ -5159,11 +7644,14 @@
           <a:lstStyle/>
           <a:p>
             <a:pPr algn="ctr"/>
-            <a:endParaRPr lang="pt-BR" sz="1400" b="1" dirty="0">
-              <a:solidFill>
-                <a:schemeClr val="tx1"/>
-              </a:solidFill>
-            </a:endParaRPr>
+            <a:r>
+              <a:rPr lang="pt-BR" sz="1200" b="1" dirty="0">
+                <a:solidFill>
+                  <a:schemeClr val="tx1"/>
+                </a:solidFill>
+              </a:rPr>
+              <a:t>Não trabalha na área que gostaria de trabalhar (arte)</a:t>
+            </a:r>
           </a:p>
         </p:txBody>
       </p:sp>

</xml_diff>

<commit_message>
PPT atualizado e mapa de empatia
</commit_message>
<xml_diff>
--- a/Mapa de Empatia.pptx
+++ b/Mapa de Empatia.pptx
@@ -263,7 +263,7 @@
           <a:p>
             <a:fld id="{94E91461-1597-4FD2-957C-70C5CCB9C0B0}" type="datetimeFigureOut">
               <a:rPr lang="pt-BR" smtClean="0"/>
-              <a:t>10/03/2020</a:t>
+              <a:t>11/03/2020</a:t>
             </a:fld>
             <a:endParaRPr lang="pt-BR"/>
           </a:p>
@@ -463,7 +463,7 @@
           <a:p>
             <a:fld id="{94E91461-1597-4FD2-957C-70C5CCB9C0B0}" type="datetimeFigureOut">
               <a:rPr lang="pt-BR" smtClean="0"/>
-              <a:t>10/03/2020</a:t>
+              <a:t>11/03/2020</a:t>
             </a:fld>
             <a:endParaRPr lang="pt-BR"/>
           </a:p>
@@ -673,7 +673,7 @@
           <a:p>
             <a:fld id="{94E91461-1597-4FD2-957C-70C5CCB9C0B0}" type="datetimeFigureOut">
               <a:rPr lang="pt-BR" smtClean="0"/>
-              <a:t>10/03/2020</a:t>
+              <a:t>11/03/2020</a:t>
             </a:fld>
             <a:endParaRPr lang="pt-BR"/>
           </a:p>
@@ -873,7 +873,7 @@
           <a:p>
             <a:fld id="{94E91461-1597-4FD2-957C-70C5CCB9C0B0}" type="datetimeFigureOut">
               <a:rPr lang="pt-BR" smtClean="0"/>
-              <a:t>10/03/2020</a:t>
+              <a:t>11/03/2020</a:t>
             </a:fld>
             <a:endParaRPr lang="pt-BR"/>
           </a:p>
@@ -1149,7 +1149,7 @@
           <a:p>
             <a:fld id="{94E91461-1597-4FD2-957C-70C5CCB9C0B0}" type="datetimeFigureOut">
               <a:rPr lang="pt-BR" smtClean="0"/>
-              <a:t>10/03/2020</a:t>
+              <a:t>11/03/2020</a:t>
             </a:fld>
             <a:endParaRPr lang="pt-BR"/>
           </a:p>
@@ -1417,7 +1417,7 @@
           <a:p>
             <a:fld id="{94E91461-1597-4FD2-957C-70C5CCB9C0B0}" type="datetimeFigureOut">
               <a:rPr lang="pt-BR" smtClean="0"/>
-              <a:t>10/03/2020</a:t>
+              <a:t>11/03/2020</a:t>
             </a:fld>
             <a:endParaRPr lang="pt-BR"/>
           </a:p>
@@ -1832,7 +1832,7 @@
           <a:p>
             <a:fld id="{94E91461-1597-4FD2-957C-70C5CCB9C0B0}" type="datetimeFigureOut">
               <a:rPr lang="pt-BR" smtClean="0"/>
-              <a:t>10/03/2020</a:t>
+              <a:t>11/03/2020</a:t>
             </a:fld>
             <a:endParaRPr lang="pt-BR"/>
           </a:p>
@@ -1974,7 +1974,7 @@
           <a:p>
             <a:fld id="{94E91461-1597-4FD2-957C-70C5CCB9C0B0}" type="datetimeFigureOut">
               <a:rPr lang="pt-BR" smtClean="0"/>
-              <a:t>10/03/2020</a:t>
+              <a:t>11/03/2020</a:t>
             </a:fld>
             <a:endParaRPr lang="pt-BR"/>
           </a:p>
@@ -2087,7 +2087,7 @@
           <a:p>
             <a:fld id="{94E91461-1597-4FD2-957C-70C5CCB9C0B0}" type="datetimeFigureOut">
               <a:rPr lang="pt-BR" smtClean="0"/>
-              <a:t>10/03/2020</a:t>
+              <a:t>11/03/2020</a:t>
             </a:fld>
             <a:endParaRPr lang="pt-BR"/>
           </a:p>
@@ -2400,7 +2400,7 @@
           <a:p>
             <a:fld id="{94E91461-1597-4FD2-957C-70C5CCB9C0B0}" type="datetimeFigureOut">
               <a:rPr lang="pt-BR" smtClean="0"/>
-              <a:t>10/03/2020</a:t>
+              <a:t>11/03/2020</a:t>
             </a:fld>
             <a:endParaRPr lang="pt-BR"/>
           </a:p>
@@ -2689,7 +2689,7 @@
           <a:p>
             <a:fld id="{94E91461-1597-4FD2-957C-70C5CCB9C0B0}" type="datetimeFigureOut">
               <a:rPr lang="pt-BR" smtClean="0"/>
-              <a:t>10/03/2020</a:t>
+              <a:t>11/03/2020</a:t>
             </a:fld>
             <a:endParaRPr lang="pt-BR"/>
           </a:p>
@@ -2932,7 +2932,7 @@
           <a:p>
             <a:fld id="{94E91461-1597-4FD2-957C-70C5CCB9C0B0}" type="datetimeFigureOut">
               <a:rPr lang="pt-BR" smtClean="0"/>
-              <a:t>10/03/2020</a:t>
+              <a:t>11/03/2020</a:t>
             </a:fld>
             <a:endParaRPr lang="pt-BR"/>
           </a:p>
@@ -3525,7 +3525,7 @@
         </p:nvSpPr>
         <p:spPr>
           <a:xfrm>
-            <a:off x="5266798" y="4463895"/>
+            <a:off x="9422609" y="4404712"/>
             <a:ext cx="1658403" cy="369332"/>
           </a:xfrm>
           <a:prstGeom prst="rect">
@@ -3560,7 +3560,7 @@
         </p:nvSpPr>
         <p:spPr>
           <a:xfrm>
-            <a:off x="0" y="3244334"/>
+            <a:off x="-52203" y="4032220"/>
             <a:ext cx="1277401" cy="369332"/>
           </a:xfrm>
           <a:prstGeom prst="rect">
@@ -3659,7 +3659,7 @@
         </p:nvSpPr>
         <p:spPr>
           <a:xfrm>
-            <a:off x="189335" y="1315134"/>
+            <a:off x="232835" y="882530"/>
             <a:ext cx="1881809" cy="914400"/>
           </a:xfrm>
           <a:prstGeom prst="rect">
@@ -3739,8 +3739,8 @@
         </p:nvSpPr>
         <p:spPr>
           <a:xfrm>
-            <a:off x="3604177" y="3558858"/>
-            <a:ext cx="1298714" cy="914400"/>
+            <a:off x="4847268" y="3157620"/>
+            <a:ext cx="1041825" cy="745326"/>
           </a:xfrm>
           <a:prstGeom prst="rect">
             <a:avLst/>
@@ -3803,8 +3803,8 @@
         </p:nvSpPr>
         <p:spPr>
           <a:xfrm>
-            <a:off x="10220556" y="1043681"/>
-            <a:ext cx="1881809" cy="914400"/>
+            <a:off x="10755086" y="641074"/>
+            <a:ext cx="1347279" cy="867609"/>
           </a:xfrm>
           <a:prstGeom prst="rect">
             <a:avLst/>
@@ -3995,8 +3995,8 @@
         </p:nvSpPr>
         <p:spPr>
           <a:xfrm>
-            <a:off x="7800431" y="1927543"/>
-            <a:ext cx="1881809" cy="914400"/>
+            <a:off x="8712277" y="1546205"/>
+            <a:ext cx="1777352" cy="927824"/>
           </a:xfrm>
           <a:prstGeom prst="rect">
             <a:avLst/>
@@ -4059,8 +4059,8 @@
         </p:nvSpPr>
         <p:spPr>
           <a:xfrm>
-            <a:off x="10120856" y="2103207"/>
-            <a:ext cx="1881809" cy="914400"/>
+            <a:off x="10755086" y="1704307"/>
+            <a:ext cx="1347279" cy="862187"/>
           </a:xfrm>
           <a:prstGeom prst="rect">
             <a:avLst/>
@@ -4104,7 +4104,7 @@
                   <a:schemeClr val="bg1"/>
                 </a:solidFill>
               </a:rPr>
-              <a:t>Cenário elitizado</a:t>
+              <a:t>Consumo de varias outras artes.</a:t>
             </a:r>
           </a:p>
         </p:txBody>
@@ -4123,8 +4123,8 @@
         </p:nvSpPr>
         <p:spPr>
           <a:xfrm>
-            <a:off x="5178402" y="3256380"/>
-            <a:ext cx="1881809" cy="914400"/>
+            <a:off x="6292879" y="3246595"/>
+            <a:ext cx="1298715" cy="598593"/>
           </a:xfrm>
           <a:prstGeom prst="rect">
             <a:avLst/>
@@ -4187,8 +4187,8 @@
         </p:nvSpPr>
         <p:spPr>
           <a:xfrm>
-            <a:off x="7320849" y="3734161"/>
-            <a:ext cx="1881809" cy="914400"/>
+            <a:off x="7841911" y="3741952"/>
+            <a:ext cx="1469047" cy="745326"/>
           </a:xfrm>
           <a:prstGeom prst="rect">
             <a:avLst/>
@@ -4232,7 +4232,7 @@
                   <a:schemeClr val="tx1"/>
                 </a:solidFill>
               </a:rPr>
-              <a:t>Tenta divulgar sua arte em várias mídias sociais</a:t>
+              <a:t>Fala que deseja viver de arte</a:t>
             </a:r>
           </a:p>
         </p:txBody>
@@ -4296,7 +4296,7 @@
                   <a:schemeClr val="tx1"/>
                 </a:solidFill>
               </a:rPr>
-              <a:t>Comparações com artistas famosos (renomados)</a:t>
+              <a:t>Ouve musicas internacionais, e também mpb</a:t>
             </a:r>
           </a:p>
         </p:txBody>
@@ -4315,8 +4315,8 @@
         </p:nvSpPr>
         <p:spPr>
           <a:xfrm>
-            <a:off x="189334" y="2326387"/>
-            <a:ext cx="1881809" cy="914400"/>
+            <a:off x="232835" y="1980503"/>
+            <a:ext cx="1851881" cy="746697"/>
           </a:xfrm>
           <a:prstGeom prst="rect">
             <a:avLst/>
@@ -4360,7 +4360,7 @@
                   <a:schemeClr val="tx1"/>
                 </a:solidFill>
               </a:rPr>
-              <a:t>Que a arte não é uma carreira a ser seguida</a:t>
+              <a:t>Amigos apoiam a seguir seu sonho</a:t>
             </a:r>
           </a:p>
         </p:txBody>
@@ -4422,13 +4422,12 @@
           </p:cNvPr>
           <p:cNvCxnSpPr>
             <a:cxnSpLocks/>
-            <a:endCxn id="11" idx="2"/>
           </p:cNvCxnSpPr>
           <p:nvPr/>
         </p:nvCxnSpPr>
         <p:spPr>
           <a:xfrm flipV="1">
-            <a:off x="6095999" y="4833227"/>
+            <a:off x="5946835" y="4831433"/>
             <a:ext cx="1" cy="2024773"/>
           </a:xfrm>
           <a:prstGeom prst="line">
@@ -5179,6 +5178,326 @@
             <a:r>
               <a:rPr lang="pt-BR" dirty="0"/>
               <a:t>Artista</a:t>
+            </a:r>
+          </a:p>
+        </p:txBody>
+      </p:sp>
+      <p:sp>
+        <p:nvSpPr>
+          <p:cNvPr id="41" name="Retângulo 40">
+            <a:extLst>
+              <a:ext uri="{FF2B5EF4-FFF2-40B4-BE49-F238E27FC236}">
+                <a16:creationId xmlns:a16="http://schemas.microsoft.com/office/drawing/2014/main" id="{00B6A075-A3CF-4BC2-BC6B-E121E6541E5E}"/>
+              </a:ext>
+            </a:extLst>
+          </p:cNvPr>
+          <p:cNvSpPr/>
+          <p:nvPr/>
+        </p:nvSpPr>
+        <p:spPr>
+          <a:xfrm>
+            <a:off x="7067469" y="2073734"/>
+            <a:ext cx="1469047" cy="622018"/>
+          </a:xfrm>
+          <a:prstGeom prst="rect">
+            <a:avLst/>
+          </a:prstGeom>
+          <a:solidFill>
+            <a:srgbClr val="7030A0"/>
+          </a:solidFill>
+          <a:ln>
+            <a:solidFill>
+              <a:schemeClr val="tx1">
+                <a:lumMod val="50000"/>
+                <a:lumOff val="50000"/>
+              </a:schemeClr>
+            </a:solidFill>
+          </a:ln>
+        </p:spPr>
+        <p:style>
+          <a:lnRef idx="2">
+            <a:schemeClr val="accent1">
+              <a:shade val="50000"/>
+            </a:schemeClr>
+          </a:lnRef>
+          <a:fillRef idx="1">
+            <a:schemeClr val="accent1"/>
+          </a:fillRef>
+          <a:effectRef idx="0">
+            <a:schemeClr val="accent1"/>
+          </a:effectRef>
+          <a:fontRef idx="minor">
+            <a:schemeClr val="lt1"/>
+          </a:fontRef>
+        </p:style>
+        <p:txBody>
+          <a:bodyPr rtlCol="0" anchor="ctr"/>
+          <a:lstStyle/>
+          <a:p>
+            <a:pPr algn="ctr"/>
+            <a:r>
+              <a:rPr lang="pt-BR" sz="1400" b="1" dirty="0">
+                <a:solidFill>
+                  <a:schemeClr val="bg1"/>
+                </a:solidFill>
+              </a:rPr>
+              <a:t>Utiliza Instagram e Twitter</a:t>
+            </a:r>
+          </a:p>
+        </p:txBody>
+      </p:sp>
+      <p:sp>
+        <p:nvSpPr>
+          <p:cNvPr id="42" name="Retângulo 41">
+            <a:extLst>
+              <a:ext uri="{FF2B5EF4-FFF2-40B4-BE49-F238E27FC236}">
+                <a16:creationId xmlns:a16="http://schemas.microsoft.com/office/drawing/2014/main" id="{9A0FA841-CC20-45CF-A401-4C7FEEAA16F6}"/>
+              </a:ext>
+            </a:extLst>
+          </p:cNvPr>
+          <p:cNvSpPr/>
+          <p:nvPr/>
+        </p:nvSpPr>
+        <p:spPr>
+          <a:xfrm>
+            <a:off x="8615261" y="2624862"/>
+            <a:ext cx="1030539" cy="677196"/>
+          </a:xfrm>
+          <a:prstGeom prst="rect">
+            <a:avLst/>
+          </a:prstGeom>
+          <a:solidFill>
+            <a:srgbClr val="7030A0"/>
+          </a:solidFill>
+          <a:ln>
+            <a:solidFill>
+              <a:schemeClr val="tx1">
+                <a:lumMod val="50000"/>
+                <a:lumOff val="50000"/>
+              </a:schemeClr>
+            </a:solidFill>
+          </a:ln>
+        </p:spPr>
+        <p:style>
+          <a:lnRef idx="2">
+            <a:schemeClr val="accent1">
+              <a:shade val="50000"/>
+            </a:schemeClr>
+          </a:lnRef>
+          <a:fillRef idx="1">
+            <a:schemeClr val="accent1"/>
+          </a:fillRef>
+          <a:effectRef idx="0">
+            <a:schemeClr val="accent1"/>
+          </a:effectRef>
+          <a:fontRef idx="minor">
+            <a:schemeClr val="lt1"/>
+          </a:fontRef>
+        </p:style>
+        <p:txBody>
+          <a:bodyPr rtlCol="0" anchor="ctr"/>
+          <a:lstStyle/>
+          <a:p>
+            <a:pPr algn="ctr"/>
+            <a:r>
+              <a:rPr lang="pt-BR" sz="1400" b="1" dirty="0">
+                <a:solidFill>
+                  <a:schemeClr val="bg1"/>
+                </a:solidFill>
+              </a:rPr>
+              <a:t>Trabalha em casa, ou na rua.</a:t>
+            </a:r>
+          </a:p>
+        </p:txBody>
+      </p:sp>
+      <p:sp>
+        <p:nvSpPr>
+          <p:cNvPr id="43" name="Retângulo 42">
+            <a:extLst>
+              <a:ext uri="{FF2B5EF4-FFF2-40B4-BE49-F238E27FC236}">
+                <a16:creationId xmlns:a16="http://schemas.microsoft.com/office/drawing/2014/main" id="{6D0EFF23-50E1-4EAB-AF6C-2F655C4EBBD7}"/>
+              </a:ext>
+            </a:extLst>
+          </p:cNvPr>
+          <p:cNvSpPr/>
+          <p:nvPr/>
+        </p:nvSpPr>
+        <p:spPr>
+          <a:xfrm>
+            <a:off x="9776438" y="2624862"/>
+            <a:ext cx="1562453" cy="700757"/>
+          </a:xfrm>
+          <a:prstGeom prst="rect">
+            <a:avLst/>
+          </a:prstGeom>
+          <a:solidFill>
+            <a:srgbClr val="7030A0"/>
+          </a:solidFill>
+          <a:ln>
+            <a:solidFill>
+              <a:schemeClr val="tx1">
+                <a:lumMod val="50000"/>
+                <a:lumOff val="50000"/>
+              </a:schemeClr>
+            </a:solidFill>
+          </a:ln>
+        </p:spPr>
+        <p:style>
+          <a:lnRef idx="2">
+            <a:schemeClr val="accent1">
+              <a:shade val="50000"/>
+            </a:schemeClr>
+          </a:lnRef>
+          <a:fillRef idx="1">
+            <a:schemeClr val="accent1"/>
+          </a:fillRef>
+          <a:effectRef idx="0">
+            <a:schemeClr val="accent1"/>
+          </a:effectRef>
+          <a:fontRef idx="minor">
+            <a:schemeClr val="lt1"/>
+          </a:fontRef>
+        </p:style>
+        <p:txBody>
+          <a:bodyPr rtlCol="0" anchor="ctr"/>
+          <a:lstStyle/>
+          <a:p>
+            <a:pPr algn="ctr"/>
+            <a:r>
+              <a:rPr lang="pt-BR" sz="1400" b="1" dirty="0">
+                <a:solidFill>
+                  <a:schemeClr val="bg1"/>
+                </a:solidFill>
+              </a:rPr>
+              <a:t>Assiste seriados.</a:t>
+            </a:r>
+          </a:p>
+        </p:txBody>
+      </p:sp>
+      <p:sp>
+        <p:nvSpPr>
+          <p:cNvPr id="44" name="Retângulo 43">
+            <a:extLst>
+              <a:ext uri="{FF2B5EF4-FFF2-40B4-BE49-F238E27FC236}">
+                <a16:creationId xmlns:a16="http://schemas.microsoft.com/office/drawing/2014/main" id="{E1AEED23-72CD-48D7-B244-E0AE67A36E2C}"/>
+              </a:ext>
+            </a:extLst>
+          </p:cNvPr>
+          <p:cNvSpPr/>
+          <p:nvPr/>
+        </p:nvSpPr>
+        <p:spPr>
+          <a:xfrm>
+            <a:off x="3404587" y="3593882"/>
+            <a:ext cx="1041825" cy="745326"/>
+          </a:xfrm>
+          <a:prstGeom prst="rect">
+            <a:avLst/>
+          </a:prstGeom>
+          <a:solidFill>
+            <a:schemeClr val="accent6"/>
+          </a:solidFill>
+          <a:ln>
+            <a:solidFill>
+              <a:schemeClr val="tx1">
+                <a:lumMod val="50000"/>
+                <a:lumOff val="50000"/>
+              </a:schemeClr>
+            </a:solidFill>
+          </a:ln>
+        </p:spPr>
+        <p:style>
+          <a:lnRef idx="2">
+            <a:schemeClr val="accent1">
+              <a:shade val="50000"/>
+            </a:schemeClr>
+          </a:lnRef>
+          <a:fillRef idx="1">
+            <a:schemeClr val="accent1"/>
+          </a:fillRef>
+          <a:effectRef idx="0">
+            <a:schemeClr val="accent1"/>
+          </a:effectRef>
+          <a:fontRef idx="minor">
+            <a:schemeClr val="lt1"/>
+          </a:fontRef>
+        </p:style>
+        <p:txBody>
+          <a:bodyPr rtlCol="0" anchor="ctr"/>
+          <a:lstStyle/>
+          <a:p>
+            <a:pPr algn="ctr"/>
+            <a:r>
+              <a:rPr lang="pt-BR" sz="1400" b="1" dirty="0">
+                <a:solidFill>
+                  <a:schemeClr val="tx1"/>
+                </a:solidFill>
+              </a:rPr>
+              <a:t>Faz trabalhos autônomos </a:t>
+            </a:r>
+          </a:p>
+        </p:txBody>
+      </p:sp>
+      <p:sp>
+        <p:nvSpPr>
+          <p:cNvPr id="46" name="Retângulo 45">
+            <a:extLst>
+              <a:ext uri="{FF2B5EF4-FFF2-40B4-BE49-F238E27FC236}">
+                <a16:creationId xmlns:a16="http://schemas.microsoft.com/office/drawing/2014/main" id="{CBE0D5FD-4E9B-47F2-83BD-F20DB06FDCFF}"/>
+              </a:ext>
+            </a:extLst>
+          </p:cNvPr>
+          <p:cNvSpPr/>
+          <p:nvPr/>
+        </p:nvSpPr>
+        <p:spPr>
+          <a:xfrm>
+            <a:off x="232834" y="2909495"/>
+            <a:ext cx="1851881" cy="746697"/>
+          </a:xfrm>
+          <a:prstGeom prst="rect">
+            <a:avLst/>
+          </a:prstGeom>
+          <a:solidFill>
+            <a:srgbClr val="FFFF00"/>
+          </a:solidFill>
+          <a:ln>
+            <a:solidFill>
+              <a:schemeClr val="tx1">
+                <a:lumMod val="50000"/>
+                <a:lumOff val="50000"/>
+              </a:schemeClr>
+            </a:solidFill>
+          </a:ln>
+        </p:spPr>
+        <p:style>
+          <a:lnRef idx="2">
+            <a:schemeClr val="accent1">
+              <a:shade val="50000"/>
+            </a:schemeClr>
+          </a:lnRef>
+          <a:fillRef idx="1">
+            <a:schemeClr val="accent1"/>
+          </a:fillRef>
+          <a:effectRef idx="0">
+            <a:schemeClr val="accent1"/>
+          </a:effectRef>
+          <a:fontRef idx="minor">
+            <a:schemeClr val="lt1"/>
+          </a:fontRef>
+        </p:style>
+        <p:txBody>
+          <a:bodyPr rtlCol="0" anchor="ctr"/>
+          <a:lstStyle/>
+          <a:p>
+            <a:pPr algn="ctr"/>
+            <a:r>
+              <a:rPr lang="pt-BR" sz="1400" b="1" dirty="0">
+                <a:solidFill>
+                  <a:schemeClr val="tx1"/>
+                </a:solidFill>
+              </a:rPr>
+              <a:t>Amigos apoiam a seguir seu sonho</a:t>
             </a:r>
           </a:p>
         </p:txBody>
@@ -5389,7 +5708,7 @@
         </p:nvSpPr>
         <p:spPr>
           <a:xfrm>
-            <a:off x="5266798" y="4463895"/>
+            <a:off x="8302220" y="4308798"/>
             <a:ext cx="1658403" cy="369332"/>
           </a:xfrm>
           <a:prstGeom prst="rect">
@@ -5424,7 +5743,7 @@
         </p:nvSpPr>
         <p:spPr>
           <a:xfrm>
-            <a:off x="0" y="3244334"/>
+            <a:off x="170278" y="3496535"/>
             <a:ext cx="1277401" cy="369332"/>
           </a:xfrm>
           <a:prstGeom prst="rect">
@@ -5523,8 +5842,8 @@
         </p:nvSpPr>
         <p:spPr>
           <a:xfrm>
-            <a:off x="189335" y="1315134"/>
-            <a:ext cx="1881809" cy="914400"/>
+            <a:off x="629261" y="848000"/>
+            <a:ext cx="1277402" cy="914400"/>
           </a:xfrm>
           <a:prstGeom prst="rect">
             <a:avLst/>
@@ -5587,8 +5906,8 @@
         </p:nvSpPr>
         <p:spPr>
           <a:xfrm>
-            <a:off x="3604177" y="3558858"/>
-            <a:ext cx="1298714" cy="914400"/>
+            <a:off x="2473717" y="3942686"/>
+            <a:ext cx="1249651" cy="716517"/>
           </a:xfrm>
           <a:prstGeom prst="rect">
             <a:avLst/>
@@ -5626,11 +5945,14 @@
           <a:lstStyle/>
           <a:p>
             <a:pPr algn="ctr"/>
-            <a:endParaRPr lang="pt-BR" sz="1400" b="1" dirty="0">
-              <a:solidFill>
-                <a:schemeClr val="tx1"/>
-              </a:solidFill>
-            </a:endParaRPr>
+            <a:r>
+              <a:rPr lang="pt-BR" sz="1400" b="1" dirty="0">
+                <a:solidFill>
+                  <a:schemeClr val="tx1"/>
+                </a:solidFill>
+              </a:rPr>
+              <a:t>Estudante de Artes Visuais </a:t>
+            </a:r>
           </a:p>
         </p:txBody>
       </p:sp>
@@ -5648,8 +5970,8 @@
         </p:nvSpPr>
         <p:spPr>
           <a:xfrm>
-            <a:off x="10223068" y="842133"/>
-            <a:ext cx="1881809" cy="914400"/>
+            <a:off x="8990413" y="2466940"/>
+            <a:ext cx="1330722" cy="555920"/>
           </a:xfrm>
           <a:prstGeom prst="rect">
             <a:avLst/>
@@ -5693,21 +6015,8 @@
                   <a:schemeClr val="bg1"/>
                 </a:solidFill>
               </a:rPr>
-              <a:t>Usa </a:t>
-            </a:r>
-            <a:r>
-              <a:rPr lang="pt-BR" sz="1400" b="1" dirty="0" err="1">
-                <a:solidFill>
-                  <a:schemeClr val="bg1"/>
-                </a:solidFill>
-              </a:rPr>
-              <a:t>tumblr</a:t>
-            </a:r>
-            <a:endParaRPr lang="pt-BR" sz="1400" b="1" dirty="0">
-              <a:solidFill>
-                <a:schemeClr val="bg1"/>
-              </a:solidFill>
-            </a:endParaRPr>
+              <a:t>Sites como Catraca Livre </a:t>
+            </a:r>
           </a:p>
         </p:txBody>
       </p:sp>
@@ -5841,10 +6150,10 @@
       </p:sp>
       <p:sp>
         <p:nvSpPr>
-          <p:cNvPr id="19" name="Retângulo 18">
-            <a:extLst>
-              <a:ext uri="{FF2B5EF4-FFF2-40B4-BE49-F238E27FC236}">
-                <a16:creationId xmlns:a16="http://schemas.microsoft.com/office/drawing/2014/main" id="{1DC36F20-34CF-409C-A1B5-7E27D4FA6306}"/>
+          <p:cNvPr id="21" name="Retângulo 20">
+            <a:extLst>
+              <a:ext uri="{FF2B5EF4-FFF2-40B4-BE49-F238E27FC236}">
+                <a16:creationId xmlns:a16="http://schemas.microsoft.com/office/drawing/2014/main" id="{A26E5934-960F-429B-BDFF-3408B15947B0}"/>
               </a:ext>
             </a:extLst>
           </p:cNvPr>
@@ -5853,133 +6162,8 @@
         </p:nvSpPr>
         <p:spPr>
           <a:xfrm>
-            <a:off x="7800431" y="1927543"/>
-            <a:ext cx="1881809" cy="914400"/>
-          </a:xfrm>
-          <a:prstGeom prst="rect">
-            <a:avLst/>
-          </a:prstGeom>
-          <a:solidFill>
-            <a:srgbClr val="7030A0"/>
-          </a:solidFill>
-          <a:ln>
-            <a:solidFill>
-              <a:schemeClr val="tx1">
-                <a:lumMod val="50000"/>
-                <a:lumOff val="50000"/>
-              </a:schemeClr>
-            </a:solidFill>
-          </a:ln>
-        </p:spPr>
-        <p:style>
-          <a:lnRef idx="2">
-            <a:schemeClr val="accent1">
-              <a:shade val="50000"/>
-            </a:schemeClr>
-          </a:lnRef>
-          <a:fillRef idx="1">
-            <a:schemeClr val="accent1"/>
-          </a:fillRef>
-          <a:effectRef idx="0">
-            <a:schemeClr val="accent1"/>
-          </a:effectRef>
-          <a:fontRef idx="minor">
-            <a:schemeClr val="lt1"/>
-          </a:fontRef>
-        </p:style>
-        <p:txBody>
-          <a:bodyPr rtlCol="0" anchor="ctr"/>
-          <a:lstStyle/>
-          <a:p>
-            <a:pPr algn="ctr"/>
-            <a:r>
-              <a:rPr lang="pt-BR" sz="1400" b="1" dirty="0">
-                <a:solidFill>
-                  <a:schemeClr val="bg1"/>
-                </a:solidFill>
-              </a:rPr>
-              <a:t>Diversidade de Pessoas</a:t>
-            </a:r>
-          </a:p>
-        </p:txBody>
-      </p:sp>
-      <p:sp>
-        <p:nvSpPr>
-          <p:cNvPr id="20" name="Retângulo 19">
-            <a:extLst>
-              <a:ext uri="{FF2B5EF4-FFF2-40B4-BE49-F238E27FC236}">
-                <a16:creationId xmlns:a16="http://schemas.microsoft.com/office/drawing/2014/main" id="{E76A26BF-ABA7-442B-9BE7-684B32361D06}"/>
-              </a:ext>
-            </a:extLst>
-          </p:cNvPr>
-          <p:cNvSpPr/>
-          <p:nvPr/>
-        </p:nvSpPr>
-        <p:spPr>
-          <a:xfrm>
-            <a:off x="10120856" y="2103207"/>
-            <a:ext cx="1881809" cy="914400"/>
-          </a:xfrm>
-          <a:prstGeom prst="rect">
-            <a:avLst/>
-          </a:prstGeom>
-          <a:solidFill>
-            <a:srgbClr val="7030A0"/>
-          </a:solidFill>
-          <a:ln>
-            <a:solidFill>
-              <a:schemeClr val="tx1">
-                <a:lumMod val="50000"/>
-                <a:lumOff val="50000"/>
-              </a:schemeClr>
-            </a:solidFill>
-          </a:ln>
-        </p:spPr>
-        <p:style>
-          <a:lnRef idx="2">
-            <a:schemeClr val="accent1">
-              <a:shade val="50000"/>
-            </a:schemeClr>
-          </a:lnRef>
-          <a:fillRef idx="1">
-            <a:schemeClr val="accent1"/>
-          </a:fillRef>
-          <a:effectRef idx="0">
-            <a:schemeClr val="accent1"/>
-          </a:effectRef>
-          <a:fontRef idx="minor">
-            <a:schemeClr val="lt1"/>
-          </a:fontRef>
-        </p:style>
-        <p:txBody>
-          <a:bodyPr rtlCol="0" anchor="ctr"/>
-          <a:lstStyle/>
-          <a:p>
-            <a:pPr algn="ctr"/>
-            <a:endParaRPr lang="pt-BR" sz="1400" b="1" dirty="0">
-              <a:solidFill>
-                <a:schemeClr val="bg1"/>
-              </a:solidFill>
-            </a:endParaRPr>
-          </a:p>
-        </p:txBody>
-      </p:sp>
-      <p:sp>
-        <p:nvSpPr>
-          <p:cNvPr id="21" name="Retângulo 20">
-            <a:extLst>
-              <a:ext uri="{FF2B5EF4-FFF2-40B4-BE49-F238E27FC236}">
-                <a16:creationId xmlns:a16="http://schemas.microsoft.com/office/drawing/2014/main" id="{A26E5934-960F-429B-BDFF-3408B15947B0}"/>
-              </a:ext>
-            </a:extLst>
-          </p:cNvPr>
-          <p:cNvSpPr/>
-          <p:nvPr/>
-        </p:nvSpPr>
-        <p:spPr>
-          <a:xfrm>
-            <a:off x="5178402" y="3256380"/>
-            <a:ext cx="1881809" cy="914400"/>
+            <a:off x="4371629" y="3260136"/>
+            <a:ext cx="1629703" cy="725218"/>
           </a:xfrm>
           <a:prstGeom prst="rect">
             <a:avLst/>
@@ -6017,11 +6201,14 @@
           <a:lstStyle/>
           <a:p>
             <a:pPr algn="ctr"/>
-            <a:endParaRPr lang="pt-BR" sz="1400" b="1" dirty="0">
-              <a:solidFill>
-                <a:schemeClr val="tx1"/>
-              </a:solidFill>
-            </a:endParaRPr>
+            <a:r>
+              <a:rPr lang="pt-BR" sz="1400" b="1" dirty="0">
+                <a:solidFill>
+                  <a:schemeClr val="tx1"/>
+                </a:solidFill>
+              </a:rPr>
+              <a:t>Voluntário em curadorias de museu </a:t>
+            </a:r>
           </a:p>
         </p:txBody>
       </p:sp>
@@ -6039,8 +6226,8 @@
         </p:nvSpPr>
         <p:spPr>
           <a:xfrm>
-            <a:off x="7320849" y="3734161"/>
-            <a:ext cx="1881809" cy="914400"/>
+            <a:off x="6483903" y="3276296"/>
+            <a:ext cx="1761007" cy="768952"/>
           </a:xfrm>
           <a:prstGeom prst="rect">
             <a:avLst/>
@@ -6078,11 +6265,14 @@
           <a:lstStyle/>
           <a:p>
             <a:pPr algn="ctr"/>
-            <a:endParaRPr lang="pt-BR" sz="1400" b="1" dirty="0">
-              <a:solidFill>
-                <a:schemeClr val="tx1"/>
-              </a:solidFill>
-            </a:endParaRPr>
+            <a:r>
+              <a:rPr lang="pt-BR" sz="1400" b="1" dirty="0">
+                <a:solidFill>
+                  <a:schemeClr val="tx1"/>
+                </a:solidFill>
+              </a:rPr>
+              <a:t>Vai ao cinema ao menos uma vez por semana</a:t>
+            </a:r>
           </a:p>
         </p:txBody>
       </p:sp>
@@ -6100,8 +6290,8 @@
         </p:nvSpPr>
         <p:spPr>
           <a:xfrm>
-            <a:off x="2260477" y="1960889"/>
-            <a:ext cx="1881809" cy="914400"/>
+            <a:off x="3719509" y="2185514"/>
+            <a:ext cx="1249651" cy="548902"/>
           </a:xfrm>
           <a:prstGeom prst="rect">
             <a:avLst/>
@@ -6139,11 +6329,14 @@
           <a:lstStyle/>
           <a:p>
             <a:pPr algn="ctr"/>
-            <a:endParaRPr lang="pt-BR" sz="1400" b="1" dirty="0">
-              <a:solidFill>
-                <a:schemeClr val="tx1"/>
-              </a:solidFill>
-            </a:endParaRPr>
+            <a:r>
+              <a:rPr lang="pt-BR" sz="1400" b="1" dirty="0">
+                <a:solidFill>
+                  <a:schemeClr val="tx1"/>
+                </a:solidFill>
+              </a:rPr>
+              <a:t>MPB, alternativo</a:t>
+            </a:r>
           </a:p>
         </p:txBody>
       </p:sp>
@@ -6161,8 +6354,8 @@
         </p:nvSpPr>
         <p:spPr>
           <a:xfrm>
-            <a:off x="189334" y="2326387"/>
-            <a:ext cx="1881809" cy="914400"/>
+            <a:off x="1126746" y="2789317"/>
+            <a:ext cx="1629703" cy="787392"/>
           </a:xfrm>
           <a:prstGeom prst="rect">
             <a:avLst/>
@@ -6206,7 +6399,7 @@
                   <a:schemeClr val="tx1"/>
                 </a:solidFill>
               </a:rPr>
-              <a:t>Escuta diversos estilos musicais </a:t>
+              <a:t>Escuta muito sobre à falta de incentivo a cultura no Brasil </a:t>
             </a:r>
           </a:p>
         </p:txBody>
@@ -6268,13 +6461,12 @@
           </p:cNvPr>
           <p:cNvCxnSpPr>
             <a:cxnSpLocks/>
-            <a:endCxn id="11" idx="2"/>
           </p:cNvCxnSpPr>
           <p:nvPr/>
         </p:nvCxnSpPr>
         <p:spPr>
           <a:xfrm flipV="1">
-            <a:off x="6095999" y="4833227"/>
+            <a:off x="5912811" y="4838981"/>
             <a:ext cx="1" cy="2024773"/>
           </a:xfrm>
           <a:prstGeom prst="line">
@@ -6897,6 +7089,531 @@
             <a:r>
               <a:rPr lang="pt-BR" dirty="0"/>
               <a:t>Público</a:t>
+            </a:r>
+          </a:p>
+        </p:txBody>
+      </p:sp>
+      <p:sp>
+        <p:nvSpPr>
+          <p:cNvPr id="32" name="Retângulo 31">
+            <a:extLst>
+              <a:ext uri="{FF2B5EF4-FFF2-40B4-BE49-F238E27FC236}">
+                <a16:creationId xmlns:a16="http://schemas.microsoft.com/office/drawing/2014/main" id="{A939CC96-F046-4030-926F-D2330DE41CE1}"/>
+              </a:ext>
+            </a:extLst>
+          </p:cNvPr>
+          <p:cNvSpPr/>
+          <p:nvPr/>
+        </p:nvSpPr>
+        <p:spPr>
+          <a:xfrm>
+            <a:off x="9830739" y="1536580"/>
+            <a:ext cx="1330722" cy="568656"/>
+          </a:xfrm>
+          <a:prstGeom prst="rect">
+            <a:avLst/>
+          </a:prstGeom>
+          <a:solidFill>
+            <a:srgbClr val="7030A0"/>
+          </a:solidFill>
+          <a:ln>
+            <a:solidFill>
+              <a:schemeClr val="tx1">
+                <a:lumMod val="50000"/>
+                <a:lumOff val="50000"/>
+              </a:schemeClr>
+            </a:solidFill>
+          </a:ln>
+        </p:spPr>
+        <p:style>
+          <a:lnRef idx="2">
+            <a:schemeClr val="accent1">
+              <a:shade val="50000"/>
+            </a:schemeClr>
+          </a:lnRef>
+          <a:fillRef idx="1">
+            <a:schemeClr val="accent1"/>
+          </a:fillRef>
+          <a:effectRef idx="0">
+            <a:schemeClr val="accent1"/>
+          </a:effectRef>
+          <a:fontRef idx="minor">
+            <a:schemeClr val="lt1"/>
+          </a:fontRef>
+        </p:style>
+        <p:txBody>
+          <a:bodyPr rtlCol="0" anchor="ctr"/>
+          <a:lstStyle/>
+          <a:p>
+            <a:pPr algn="ctr"/>
+            <a:r>
+              <a:rPr lang="pt-BR" sz="1400" b="1" dirty="0">
+                <a:solidFill>
+                  <a:schemeClr val="bg1"/>
+                </a:solidFill>
+              </a:rPr>
+              <a:t>Instagram</a:t>
+            </a:r>
+          </a:p>
+        </p:txBody>
+      </p:sp>
+      <p:sp>
+        <p:nvSpPr>
+          <p:cNvPr id="41" name="Retângulo 40">
+            <a:extLst>
+              <a:ext uri="{FF2B5EF4-FFF2-40B4-BE49-F238E27FC236}">
+                <a16:creationId xmlns:a16="http://schemas.microsoft.com/office/drawing/2014/main" id="{860A7E30-817B-4604-8B5D-133E2C043741}"/>
+              </a:ext>
+            </a:extLst>
+          </p:cNvPr>
+          <p:cNvSpPr/>
+          <p:nvPr/>
+        </p:nvSpPr>
+        <p:spPr>
+          <a:xfrm>
+            <a:off x="7871936" y="1795881"/>
+            <a:ext cx="1330722" cy="568656"/>
+          </a:xfrm>
+          <a:prstGeom prst="rect">
+            <a:avLst/>
+          </a:prstGeom>
+          <a:solidFill>
+            <a:srgbClr val="7030A0"/>
+          </a:solidFill>
+          <a:ln>
+            <a:solidFill>
+              <a:schemeClr val="tx1">
+                <a:lumMod val="50000"/>
+                <a:lumOff val="50000"/>
+              </a:schemeClr>
+            </a:solidFill>
+          </a:ln>
+        </p:spPr>
+        <p:style>
+          <a:lnRef idx="2">
+            <a:schemeClr val="accent1">
+              <a:shade val="50000"/>
+            </a:schemeClr>
+          </a:lnRef>
+          <a:fillRef idx="1">
+            <a:schemeClr val="accent1"/>
+          </a:fillRef>
+          <a:effectRef idx="0">
+            <a:schemeClr val="accent1"/>
+          </a:effectRef>
+          <a:fontRef idx="minor">
+            <a:schemeClr val="lt1"/>
+          </a:fontRef>
+        </p:style>
+        <p:txBody>
+          <a:bodyPr rtlCol="0" anchor="ctr"/>
+          <a:lstStyle/>
+          <a:p>
+            <a:pPr algn="ctr"/>
+            <a:r>
+              <a:rPr lang="pt-BR" sz="1400" b="1" dirty="0">
+                <a:solidFill>
+                  <a:schemeClr val="bg1"/>
+                </a:solidFill>
+              </a:rPr>
+              <a:t>Diversidade de Pessoas</a:t>
+            </a:r>
+          </a:p>
+        </p:txBody>
+      </p:sp>
+      <p:sp>
+        <p:nvSpPr>
+          <p:cNvPr id="42" name="Retângulo 41">
+            <a:extLst>
+              <a:ext uri="{FF2B5EF4-FFF2-40B4-BE49-F238E27FC236}">
+                <a16:creationId xmlns:a16="http://schemas.microsoft.com/office/drawing/2014/main" id="{6CE1B754-F162-482C-8C1C-F7FAA19B0710}"/>
+              </a:ext>
+            </a:extLst>
+          </p:cNvPr>
+          <p:cNvSpPr/>
+          <p:nvPr/>
+        </p:nvSpPr>
+        <p:spPr>
+          <a:xfrm>
+            <a:off x="9830739" y="3241286"/>
+            <a:ext cx="1330722" cy="568656"/>
+          </a:xfrm>
+          <a:prstGeom prst="rect">
+            <a:avLst/>
+          </a:prstGeom>
+          <a:solidFill>
+            <a:srgbClr val="7030A0"/>
+          </a:solidFill>
+          <a:ln>
+            <a:solidFill>
+              <a:schemeClr val="tx1">
+                <a:lumMod val="50000"/>
+                <a:lumOff val="50000"/>
+              </a:schemeClr>
+            </a:solidFill>
+          </a:ln>
+        </p:spPr>
+        <p:style>
+          <a:lnRef idx="2">
+            <a:schemeClr val="accent1">
+              <a:shade val="50000"/>
+            </a:schemeClr>
+          </a:lnRef>
+          <a:fillRef idx="1">
+            <a:schemeClr val="accent1"/>
+          </a:fillRef>
+          <a:effectRef idx="0">
+            <a:schemeClr val="accent1"/>
+          </a:effectRef>
+          <a:fontRef idx="minor">
+            <a:schemeClr val="lt1"/>
+          </a:fontRef>
+        </p:style>
+        <p:txBody>
+          <a:bodyPr rtlCol="0" anchor="ctr"/>
+          <a:lstStyle/>
+          <a:p>
+            <a:pPr algn="ctr"/>
+            <a:r>
+              <a:rPr lang="pt-BR" sz="1400" b="1" dirty="0">
+                <a:solidFill>
+                  <a:schemeClr val="bg1"/>
+                </a:solidFill>
+              </a:rPr>
+              <a:t>Cinema</a:t>
+            </a:r>
+          </a:p>
+        </p:txBody>
+      </p:sp>
+      <p:sp>
+        <p:nvSpPr>
+          <p:cNvPr id="43" name="Retângulo 42">
+            <a:extLst>
+              <a:ext uri="{FF2B5EF4-FFF2-40B4-BE49-F238E27FC236}">
+                <a16:creationId xmlns:a16="http://schemas.microsoft.com/office/drawing/2014/main" id="{6F87AC75-15AD-41D8-8878-6C66B02717E5}"/>
+              </a:ext>
+            </a:extLst>
+          </p:cNvPr>
+          <p:cNvSpPr/>
+          <p:nvPr/>
+        </p:nvSpPr>
+        <p:spPr>
+          <a:xfrm>
+            <a:off x="10641643" y="2368675"/>
+            <a:ext cx="1330722" cy="568656"/>
+          </a:xfrm>
+          <a:prstGeom prst="rect">
+            <a:avLst/>
+          </a:prstGeom>
+          <a:solidFill>
+            <a:srgbClr val="7030A0"/>
+          </a:solidFill>
+          <a:ln>
+            <a:solidFill>
+              <a:schemeClr val="tx1">
+                <a:lumMod val="50000"/>
+                <a:lumOff val="50000"/>
+              </a:schemeClr>
+            </a:solidFill>
+          </a:ln>
+        </p:spPr>
+        <p:style>
+          <a:lnRef idx="2">
+            <a:schemeClr val="accent1">
+              <a:shade val="50000"/>
+            </a:schemeClr>
+          </a:lnRef>
+          <a:fillRef idx="1">
+            <a:schemeClr val="accent1"/>
+          </a:fillRef>
+          <a:effectRef idx="0">
+            <a:schemeClr val="accent1"/>
+          </a:effectRef>
+          <a:fontRef idx="minor">
+            <a:schemeClr val="lt1"/>
+          </a:fontRef>
+        </p:style>
+        <p:txBody>
+          <a:bodyPr rtlCol="0" anchor="ctr"/>
+          <a:lstStyle/>
+          <a:p>
+            <a:pPr algn="ctr"/>
+            <a:r>
+              <a:rPr lang="pt-BR" sz="1400" b="1" dirty="0">
+                <a:solidFill>
+                  <a:schemeClr val="bg1"/>
+                </a:solidFill>
+              </a:rPr>
+              <a:t>Exposições</a:t>
+            </a:r>
+          </a:p>
+        </p:txBody>
+      </p:sp>
+      <p:sp>
+        <p:nvSpPr>
+          <p:cNvPr id="44" name="Retângulo 43">
+            <a:extLst>
+              <a:ext uri="{FF2B5EF4-FFF2-40B4-BE49-F238E27FC236}">
+                <a16:creationId xmlns:a16="http://schemas.microsoft.com/office/drawing/2014/main" id="{F546834D-2749-412E-88A1-72368C43D7B4}"/>
+              </a:ext>
+            </a:extLst>
+          </p:cNvPr>
+          <p:cNvSpPr/>
+          <p:nvPr/>
+        </p:nvSpPr>
+        <p:spPr>
+          <a:xfrm>
+            <a:off x="10641643" y="794102"/>
+            <a:ext cx="1330722" cy="568656"/>
+          </a:xfrm>
+          <a:prstGeom prst="rect">
+            <a:avLst/>
+          </a:prstGeom>
+          <a:solidFill>
+            <a:srgbClr val="7030A0"/>
+          </a:solidFill>
+          <a:ln>
+            <a:solidFill>
+              <a:schemeClr val="tx1">
+                <a:lumMod val="50000"/>
+                <a:lumOff val="50000"/>
+              </a:schemeClr>
+            </a:solidFill>
+          </a:ln>
+        </p:spPr>
+        <p:style>
+          <a:lnRef idx="2">
+            <a:schemeClr val="accent1">
+              <a:shade val="50000"/>
+            </a:schemeClr>
+          </a:lnRef>
+          <a:fillRef idx="1">
+            <a:schemeClr val="accent1"/>
+          </a:fillRef>
+          <a:effectRef idx="0">
+            <a:schemeClr val="accent1"/>
+          </a:effectRef>
+          <a:fontRef idx="minor">
+            <a:schemeClr val="lt1"/>
+          </a:fontRef>
+        </p:style>
+        <p:txBody>
+          <a:bodyPr rtlCol="0" anchor="ctr"/>
+          <a:lstStyle/>
+          <a:p>
+            <a:pPr algn="ctr"/>
+            <a:r>
+              <a:rPr lang="pt-BR" sz="1400" b="1" dirty="0">
+                <a:solidFill>
+                  <a:schemeClr val="bg1"/>
+                </a:solidFill>
+              </a:rPr>
+              <a:t>Usa </a:t>
+            </a:r>
+            <a:r>
+              <a:rPr lang="pt-BR" sz="1400" b="1" dirty="0" err="1">
+                <a:solidFill>
+                  <a:schemeClr val="bg1"/>
+                </a:solidFill>
+              </a:rPr>
+              <a:t>tumblr</a:t>
+            </a:r>
+            <a:endParaRPr lang="pt-BR" sz="1400" b="1" dirty="0">
+              <a:solidFill>
+                <a:schemeClr val="bg1"/>
+              </a:solidFill>
+            </a:endParaRPr>
+          </a:p>
+        </p:txBody>
+      </p:sp>
+      <p:sp>
+        <p:nvSpPr>
+          <p:cNvPr id="45" name="Retângulo 44">
+            <a:extLst>
+              <a:ext uri="{FF2B5EF4-FFF2-40B4-BE49-F238E27FC236}">
+                <a16:creationId xmlns:a16="http://schemas.microsoft.com/office/drawing/2014/main" id="{BFEAA0CA-F2CE-42FA-8855-D88D9CD59BF7}"/>
+              </a:ext>
+            </a:extLst>
+          </p:cNvPr>
+          <p:cNvSpPr/>
+          <p:nvPr/>
+        </p:nvSpPr>
+        <p:spPr>
+          <a:xfrm>
+            <a:off x="170278" y="1914219"/>
+            <a:ext cx="1249651" cy="548902"/>
+          </a:xfrm>
+          <a:prstGeom prst="rect">
+            <a:avLst/>
+          </a:prstGeom>
+          <a:solidFill>
+            <a:srgbClr val="FFFF00"/>
+          </a:solidFill>
+          <a:ln>
+            <a:solidFill>
+              <a:schemeClr val="tx1">
+                <a:lumMod val="50000"/>
+                <a:lumOff val="50000"/>
+              </a:schemeClr>
+            </a:solidFill>
+          </a:ln>
+        </p:spPr>
+        <p:style>
+          <a:lnRef idx="2">
+            <a:schemeClr val="accent1">
+              <a:shade val="50000"/>
+            </a:schemeClr>
+          </a:lnRef>
+          <a:fillRef idx="1">
+            <a:schemeClr val="accent1"/>
+          </a:fillRef>
+          <a:effectRef idx="0">
+            <a:schemeClr val="accent1"/>
+          </a:effectRef>
+          <a:fontRef idx="minor">
+            <a:schemeClr val="lt1"/>
+          </a:fontRef>
+        </p:style>
+        <p:txBody>
+          <a:bodyPr rtlCol="0" anchor="ctr"/>
+          <a:lstStyle/>
+          <a:p>
+            <a:pPr algn="ctr"/>
+            <a:r>
+              <a:rPr lang="pt-BR" sz="1400" b="1" dirty="0">
+                <a:solidFill>
+                  <a:schemeClr val="tx1"/>
+                </a:solidFill>
+              </a:rPr>
+              <a:t>Podcasts Variados</a:t>
+            </a:r>
+          </a:p>
+        </p:txBody>
+      </p:sp>
+      <p:sp>
+        <p:nvSpPr>
+          <p:cNvPr id="46" name="Retângulo 45">
+            <a:extLst>
+              <a:ext uri="{FF2B5EF4-FFF2-40B4-BE49-F238E27FC236}">
+                <a16:creationId xmlns:a16="http://schemas.microsoft.com/office/drawing/2014/main" id="{DE03F6C2-18D7-4D34-B6F1-9C1B0F64989C}"/>
+              </a:ext>
+            </a:extLst>
+          </p:cNvPr>
+          <p:cNvSpPr/>
+          <p:nvPr/>
+        </p:nvSpPr>
+        <p:spPr>
+          <a:xfrm>
+            <a:off x="2066407" y="1461692"/>
+            <a:ext cx="1507966" cy="1028886"/>
+          </a:xfrm>
+          <a:prstGeom prst="rect">
+            <a:avLst/>
+          </a:prstGeom>
+          <a:solidFill>
+            <a:srgbClr val="FFFF00"/>
+          </a:solidFill>
+          <a:ln>
+            <a:solidFill>
+              <a:schemeClr val="tx1">
+                <a:lumMod val="50000"/>
+                <a:lumOff val="50000"/>
+              </a:schemeClr>
+            </a:solidFill>
+          </a:ln>
+        </p:spPr>
+        <p:style>
+          <a:lnRef idx="2">
+            <a:schemeClr val="accent1">
+              <a:shade val="50000"/>
+            </a:schemeClr>
+          </a:lnRef>
+          <a:fillRef idx="1">
+            <a:schemeClr val="accent1"/>
+          </a:fillRef>
+          <a:effectRef idx="0">
+            <a:schemeClr val="accent1"/>
+          </a:effectRef>
+          <a:fontRef idx="minor">
+            <a:schemeClr val="lt1"/>
+          </a:fontRef>
+        </p:style>
+        <p:txBody>
+          <a:bodyPr rtlCol="0" anchor="ctr"/>
+          <a:lstStyle/>
+          <a:p>
+            <a:pPr algn="ctr"/>
+            <a:r>
+              <a:rPr lang="pt-BR" sz="1400" b="1" dirty="0">
+                <a:solidFill>
+                  <a:schemeClr val="tx1"/>
+                </a:solidFill>
+              </a:rPr>
+              <a:t>Escuta sobre falhas na direção do ministério da cultura</a:t>
+            </a:r>
+          </a:p>
+        </p:txBody>
+      </p:sp>
+      <p:sp>
+        <p:nvSpPr>
+          <p:cNvPr id="47" name="Retângulo 46">
+            <a:extLst>
+              <a:ext uri="{FF2B5EF4-FFF2-40B4-BE49-F238E27FC236}">
+                <a16:creationId xmlns:a16="http://schemas.microsoft.com/office/drawing/2014/main" id="{50DB440B-9DD3-41E7-8E05-A624E54928F0}"/>
+              </a:ext>
+            </a:extLst>
+          </p:cNvPr>
+          <p:cNvSpPr/>
+          <p:nvPr/>
+        </p:nvSpPr>
+        <p:spPr>
+          <a:xfrm>
+            <a:off x="4823194" y="4136699"/>
+            <a:ext cx="2341656" cy="467304"/>
+          </a:xfrm>
+          <a:prstGeom prst="rect">
+            <a:avLst/>
+          </a:prstGeom>
+          <a:solidFill>
+            <a:schemeClr val="accent6"/>
+          </a:solidFill>
+          <a:ln>
+            <a:solidFill>
+              <a:schemeClr val="tx1">
+                <a:lumMod val="50000"/>
+                <a:lumOff val="50000"/>
+              </a:schemeClr>
+            </a:solidFill>
+          </a:ln>
+        </p:spPr>
+        <p:style>
+          <a:lnRef idx="2">
+            <a:schemeClr val="accent1">
+              <a:shade val="50000"/>
+            </a:schemeClr>
+          </a:lnRef>
+          <a:fillRef idx="1">
+            <a:schemeClr val="accent1"/>
+          </a:fillRef>
+          <a:effectRef idx="0">
+            <a:schemeClr val="accent1"/>
+          </a:effectRef>
+          <a:fontRef idx="minor">
+            <a:schemeClr val="lt1"/>
+          </a:fontRef>
+        </p:style>
+        <p:txBody>
+          <a:bodyPr rtlCol="0" anchor="ctr"/>
+          <a:lstStyle/>
+          <a:p>
+            <a:pPr algn="ctr"/>
+            <a:r>
+              <a:rPr lang="pt-BR" sz="1400" b="1" dirty="0">
+                <a:solidFill>
+                  <a:schemeClr val="tx1"/>
+                </a:solidFill>
+              </a:rPr>
+              <a:t>Muito intenso e verdadeiro com as pessoas </a:t>
             </a:r>
           </a:p>
         </p:txBody>

</xml_diff>